<commit_message>
final run on main and trade (maybe)
</commit_message>
<xml_diff>
--- a/embedded_COEFFS_substitutability_maize_quadrant_full_5.0.pptx
+++ b/embedded_COEFFS_substitutability_maize_quadrant_full_5.0.pptx
@@ -6,6 +6,7 @@
   </p:sldMasterIdLst>
   <p:sldIdLst>
     <p:sldId id="258" r:id="rId2"/>
+    <p:sldId id="259" r:id="rId3"/>
   </p:sldIdLst>
   <p:sldSz cx="12192000" cy="6858000"/>
   <p:notesSz cx="6858000" cy="9144000"/>
@@ -241,7 +242,7 @@
           <a:p>
             <a:fld id="{B4F1BE71-D697-4FA9-9464-5030FED053B9}" type="datetimeFigureOut">
               <a:rPr lang="fr-FR" smtClean="0"/>
-              <a:t>13/10/2024</a:t>
+              <a:t>15/10/2024</a:t>
             </a:fld>
             <a:endParaRPr lang="fr-FR"/>
           </a:p>
@@ -409,7 +410,7 @@
           <a:p>
             <a:fld id="{B4F1BE71-D697-4FA9-9464-5030FED053B9}" type="datetimeFigureOut">
               <a:rPr lang="fr-FR" smtClean="0"/>
-              <a:t>13/10/2024</a:t>
+              <a:t>15/10/2024</a:t>
             </a:fld>
             <a:endParaRPr lang="fr-FR"/>
           </a:p>
@@ -587,7 +588,7 @@
           <a:p>
             <a:fld id="{B4F1BE71-D697-4FA9-9464-5030FED053B9}" type="datetimeFigureOut">
               <a:rPr lang="fr-FR" smtClean="0"/>
-              <a:t>13/10/2024</a:t>
+              <a:t>15/10/2024</a:t>
             </a:fld>
             <a:endParaRPr lang="fr-FR"/>
           </a:p>
@@ -755,7 +756,7 @@
           <a:p>
             <a:fld id="{B4F1BE71-D697-4FA9-9464-5030FED053B9}" type="datetimeFigureOut">
               <a:rPr lang="fr-FR" smtClean="0"/>
-              <a:t>13/10/2024</a:t>
+              <a:t>15/10/2024</a:t>
             </a:fld>
             <a:endParaRPr lang="fr-FR"/>
           </a:p>
@@ -1000,7 +1001,7 @@
           <a:p>
             <a:fld id="{B4F1BE71-D697-4FA9-9464-5030FED053B9}" type="datetimeFigureOut">
               <a:rPr lang="fr-FR" smtClean="0"/>
-              <a:t>13/10/2024</a:t>
+              <a:t>15/10/2024</a:t>
             </a:fld>
             <a:endParaRPr lang="fr-FR"/>
           </a:p>
@@ -1229,7 +1230,7 @@
           <a:p>
             <a:fld id="{B4F1BE71-D697-4FA9-9464-5030FED053B9}" type="datetimeFigureOut">
               <a:rPr lang="fr-FR" smtClean="0"/>
-              <a:t>13/10/2024</a:t>
+              <a:t>15/10/2024</a:t>
             </a:fld>
             <a:endParaRPr lang="fr-FR"/>
           </a:p>
@@ -1593,7 +1594,7 @@
           <a:p>
             <a:fld id="{B4F1BE71-D697-4FA9-9464-5030FED053B9}" type="datetimeFigureOut">
               <a:rPr lang="fr-FR" smtClean="0"/>
-              <a:t>13/10/2024</a:t>
+              <a:t>15/10/2024</a:t>
             </a:fld>
             <a:endParaRPr lang="fr-FR"/>
           </a:p>
@@ -1710,7 +1711,7 @@
           <a:p>
             <a:fld id="{B4F1BE71-D697-4FA9-9464-5030FED053B9}" type="datetimeFigureOut">
               <a:rPr lang="fr-FR" smtClean="0"/>
-              <a:t>13/10/2024</a:t>
+              <a:t>15/10/2024</a:t>
             </a:fld>
             <a:endParaRPr lang="fr-FR"/>
           </a:p>
@@ -1805,7 +1806,7 @@
           <a:p>
             <a:fld id="{B4F1BE71-D697-4FA9-9464-5030FED053B9}" type="datetimeFigureOut">
               <a:rPr lang="fr-FR" smtClean="0"/>
-              <a:t>13/10/2024</a:t>
+              <a:t>15/10/2024</a:t>
             </a:fld>
             <a:endParaRPr lang="fr-FR"/>
           </a:p>
@@ -2080,7 +2081,7 @@
           <a:p>
             <a:fld id="{B4F1BE71-D697-4FA9-9464-5030FED053B9}" type="datetimeFigureOut">
               <a:rPr lang="fr-FR" smtClean="0"/>
-              <a:t>13/10/2024</a:t>
+              <a:t>15/10/2024</a:t>
             </a:fld>
             <a:endParaRPr lang="fr-FR"/>
           </a:p>
@@ -2332,7 +2333,7 @@
           <a:p>
             <a:fld id="{B4F1BE71-D697-4FA9-9464-5030FED053B9}" type="datetimeFigureOut">
               <a:rPr lang="fr-FR" smtClean="0"/>
-              <a:t>13/10/2024</a:t>
+              <a:t>15/10/2024</a:t>
             </a:fld>
             <a:endParaRPr lang="fr-FR"/>
           </a:p>
@@ -2543,7 +2544,7 @@
           <a:p>
             <a:fld id="{B4F1BE71-D697-4FA9-9464-5030FED053B9}" type="datetimeFigureOut">
               <a:rPr lang="fr-FR" smtClean="0"/>
-              <a:t>13/10/2024</a:t>
+              <a:t>15/10/2024</a:t>
             </a:fld>
             <a:endParaRPr lang="fr-FR"/>
           </a:p>
@@ -3216,6 +3217,2148 @@
         </p:nvSpPr>
         <p:spPr>
           <a:xfrm>
+            <a:off x="339223" y="1581476"/>
+            <a:ext cx="344246" cy="4250157"/>
+          </a:xfrm>
+          <a:prstGeom prst="leftBrace">
+            <a:avLst>
+              <a:gd name="adj1" fmla="val 23958"/>
+              <a:gd name="adj2" fmla="val 50000"/>
+            </a:avLst>
+          </a:prstGeom>
+          <a:ln>
+            <a:solidFill>
+              <a:schemeClr val="tx1"/>
+            </a:solidFill>
+          </a:ln>
+        </p:spPr>
+        <p:style>
+          <a:lnRef idx="1">
+            <a:schemeClr val="accent1"/>
+          </a:lnRef>
+          <a:fillRef idx="0">
+            <a:schemeClr val="accent1"/>
+          </a:fillRef>
+          <a:effectRef idx="0">
+            <a:schemeClr val="accent1"/>
+          </a:effectRef>
+          <a:fontRef idx="minor">
+            <a:schemeClr val="tx1"/>
+          </a:fontRef>
+        </p:style>
+        <p:txBody>
+          <a:bodyPr rtlCol="0" anchor="ctr"/>
+          <a:lstStyle/>
+          <a:p>
+            <a:pPr algn="ctr"/>
+            <a:endParaRPr lang="fr-FR"/>
+          </a:p>
+        </p:txBody>
+      </p:sp>
+      <p:sp>
+        <p:nvSpPr>
+          <p:cNvPr id="59" name="ZoneTexte 58"/>
+          <p:cNvSpPr txBox="1"/>
+          <p:nvPr/>
+        </p:nvSpPr>
+        <p:spPr>
+          <a:xfrm>
+            <a:off x="1186419" y="3842738"/>
+            <a:ext cx="817922" cy="1169551"/>
+          </a:xfrm>
+          <a:prstGeom prst="rect">
+            <a:avLst/>
+          </a:prstGeom>
+          <a:noFill/>
+        </p:spPr>
+        <p:txBody>
+          <a:bodyPr wrap="square" rtlCol="0">
+            <a:spAutoFit/>
+          </a:bodyPr>
+          <a:lstStyle/>
+          <a:p>
+            <a:pPr algn="ctr"/>
+            <a:r>
+              <a:rPr lang="fr-FR" sz="1000" b="1" i="1" dirty="0" err="1">
+                <a:solidFill>
+                  <a:srgbClr val="0070C0"/>
+                </a:solidFill>
+              </a:rPr>
+              <a:t>Crowding</a:t>
+            </a:r>
+            <a:r>
+              <a:rPr lang="fr-FR" sz="1000" b="1" i="1" dirty="0">
+                <a:solidFill>
+                  <a:srgbClr val="0070C0"/>
+                </a:solidFill>
+              </a:rPr>
+              <a:t> out</a:t>
+            </a:r>
+          </a:p>
+          <a:p>
+            <a:pPr algn="ctr"/>
+            <a:r>
+              <a:rPr lang="fr-FR" sz="1000" b="1" i="1" dirty="0">
+                <a:solidFill>
+                  <a:srgbClr val="0070C0"/>
+                </a:solidFill>
+              </a:rPr>
+              <a:t>(non-land input</a:t>
+            </a:r>
+          </a:p>
+          <a:p>
+            <a:pPr algn="ctr"/>
+            <a:r>
+              <a:rPr lang="fr-FR" sz="1000" b="1" i="1" dirty="0" err="1">
+                <a:solidFill>
+                  <a:srgbClr val="0070C0"/>
+                </a:solidFill>
+              </a:rPr>
+              <a:t>constraint</a:t>
+            </a:r>
+            <a:r>
+              <a:rPr lang="fr-FR" sz="1000" b="1" i="1" dirty="0">
+                <a:solidFill>
+                  <a:srgbClr val="0070C0"/>
+                </a:solidFill>
+              </a:rPr>
+              <a:t>)</a:t>
+            </a:r>
+            <a:endParaRPr lang="fr-FR" sz="1000" b="1" dirty="0">
+              <a:solidFill>
+                <a:schemeClr val="accent1"/>
+              </a:solidFill>
+            </a:endParaRPr>
+          </a:p>
+          <a:p>
+            <a:pPr algn="ctr"/>
+            <a:endParaRPr lang="fr-FR" sz="1000" b="1" dirty="0">
+              <a:solidFill>
+                <a:schemeClr val="accent1"/>
+              </a:solidFill>
+            </a:endParaRPr>
+          </a:p>
+          <a:p>
+            <a:pPr algn="ctr"/>
+            <a:endParaRPr lang="fr-FR" sz="1000" dirty="0"/>
+          </a:p>
+        </p:txBody>
+      </p:sp>
+      <p:sp>
+        <p:nvSpPr>
+          <p:cNvPr id="31" name="Accolade ouvrante 30"/>
+          <p:cNvSpPr/>
+          <p:nvPr/>
+        </p:nvSpPr>
+        <p:spPr>
+          <a:xfrm>
+            <a:off x="1099963" y="1581478"/>
+            <a:ext cx="344246" cy="5246277"/>
+          </a:xfrm>
+          <a:prstGeom prst="leftBrace">
+            <a:avLst>
+              <a:gd name="adj1" fmla="val 23958"/>
+              <a:gd name="adj2" fmla="val 50254"/>
+            </a:avLst>
+          </a:prstGeom>
+          <a:ln>
+            <a:solidFill>
+              <a:schemeClr val="tx1"/>
+            </a:solidFill>
+          </a:ln>
+        </p:spPr>
+        <p:style>
+          <a:lnRef idx="1">
+            <a:schemeClr val="accent1"/>
+          </a:lnRef>
+          <a:fillRef idx="0">
+            <a:schemeClr val="accent1"/>
+          </a:fillRef>
+          <a:effectRef idx="0">
+            <a:schemeClr val="accent1"/>
+          </a:effectRef>
+          <a:fontRef idx="minor">
+            <a:schemeClr val="tx1"/>
+          </a:fontRef>
+        </p:style>
+        <p:txBody>
+          <a:bodyPr rtlCol="0" anchor="ctr"/>
+          <a:lstStyle/>
+          <a:p>
+            <a:pPr algn="ctr"/>
+            <a:endParaRPr lang="fr-FR"/>
+          </a:p>
+        </p:txBody>
+      </p:sp>
+      <p:cxnSp>
+        <p:nvCxnSpPr>
+          <p:cNvPr id="44" name="Connecteur en arc 43"/>
+          <p:cNvCxnSpPr>
+            <a:cxnSpLocks/>
+            <a:stCxn id="37" idx="1"/>
+            <a:endCxn id="54" idx="1"/>
+          </p:cNvCxnSpPr>
+          <p:nvPr/>
+        </p:nvCxnSpPr>
+        <p:spPr>
+          <a:xfrm rot="10800000" flipH="1" flipV="1">
+            <a:off x="282041" y="322631"/>
+            <a:ext cx="57182" cy="3383923"/>
+          </a:xfrm>
+          <a:prstGeom prst="curvedConnector3">
+            <a:avLst>
+              <a:gd name="adj1" fmla="val -399776"/>
+            </a:avLst>
+          </a:prstGeom>
+          <a:ln>
+            <a:solidFill>
+              <a:srgbClr val="C00000"/>
+            </a:solidFill>
+            <a:tailEnd type="triangle"/>
+          </a:ln>
+        </p:spPr>
+        <p:style>
+          <a:lnRef idx="2">
+            <a:schemeClr val="accent2"/>
+          </a:lnRef>
+          <a:fillRef idx="0">
+            <a:schemeClr val="accent2"/>
+          </a:fillRef>
+          <a:effectRef idx="1">
+            <a:schemeClr val="accent2"/>
+          </a:effectRef>
+          <a:fontRef idx="minor">
+            <a:schemeClr val="tx1"/>
+          </a:fontRef>
+        </p:style>
+      </p:cxnSp>
+      <p:cxnSp>
+        <p:nvCxnSpPr>
+          <p:cNvPr id="52" name="Connecteur en arc 51"/>
+          <p:cNvCxnSpPr>
+            <a:cxnSpLocks/>
+            <a:stCxn id="37" idx="1"/>
+            <a:endCxn id="31" idx="1"/>
+          </p:cNvCxnSpPr>
+          <p:nvPr/>
+        </p:nvCxnSpPr>
+        <p:spPr>
+          <a:xfrm rot="10800000" flipH="1" flipV="1">
+            <a:off x="282041" y="322632"/>
+            <a:ext cx="817922" cy="3895310"/>
+          </a:xfrm>
+          <a:prstGeom prst="curvedConnector3">
+            <a:avLst>
+              <a:gd name="adj1" fmla="val -27949"/>
+            </a:avLst>
+          </a:prstGeom>
+          <a:ln w="9525" cap="flat" cmpd="sng" algn="ctr">
+            <a:solidFill>
+              <a:schemeClr val="accent1"/>
+            </a:solidFill>
+            <a:prstDash val="dash"/>
+            <a:round/>
+            <a:headEnd type="none" w="med" len="med"/>
+            <a:tailEnd type="arrow" w="med" len="med"/>
+          </a:ln>
+        </p:spPr>
+        <p:style>
+          <a:lnRef idx="0">
+            <a:scrgbClr r="0" g="0" b="0"/>
+          </a:lnRef>
+          <a:fillRef idx="0">
+            <a:scrgbClr r="0" g="0" b="0"/>
+          </a:fillRef>
+          <a:effectRef idx="0">
+            <a:scrgbClr r="0" g="0" b="0"/>
+          </a:effectRef>
+          <a:fontRef idx="minor">
+            <a:schemeClr val="tx1"/>
+          </a:fontRef>
+        </p:style>
+      </p:cxnSp>
+      <p:sp>
+        <p:nvSpPr>
+          <p:cNvPr id="32" name="Accolade ouvrante 31"/>
+          <p:cNvSpPr/>
+          <p:nvPr/>
+        </p:nvSpPr>
+        <p:spPr>
+          <a:xfrm rot="5400000">
+            <a:off x="4800457" y="-2611656"/>
+            <a:ext cx="299791" cy="6523024"/>
+          </a:xfrm>
+          <a:prstGeom prst="leftBrace">
+            <a:avLst>
+              <a:gd name="adj1" fmla="val 23957"/>
+              <a:gd name="adj2" fmla="val 50000"/>
+            </a:avLst>
+          </a:prstGeom>
+          <a:ln>
+            <a:solidFill>
+              <a:schemeClr val="tx1"/>
+            </a:solidFill>
+          </a:ln>
+        </p:spPr>
+        <p:style>
+          <a:lnRef idx="1">
+            <a:schemeClr val="accent1"/>
+          </a:lnRef>
+          <a:fillRef idx="0">
+            <a:schemeClr val="accent1"/>
+          </a:fillRef>
+          <a:effectRef idx="0">
+            <a:schemeClr val="accent1"/>
+          </a:effectRef>
+          <a:fontRef idx="minor">
+            <a:schemeClr val="tx1"/>
+          </a:fontRef>
+        </p:style>
+        <p:txBody>
+          <a:bodyPr rtlCol="0" anchor="ctr"/>
+          <a:lstStyle/>
+          <a:p>
+            <a:pPr algn="ctr"/>
+            <a:endParaRPr lang="fr-FR"/>
+          </a:p>
+        </p:txBody>
+      </p:sp>
+      <p:sp>
+        <p:nvSpPr>
+          <p:cNvPr id="56" name="ZoneTexte 55"/>
+          <p:cNvSpPr txBox="1"/>
+          <p:nvPr/>
+        </p:nvSpPr>
+        <p:spPr>
+          <a:xfrm>
+            <a:off x="3483928" y="1319867"/>
+            <a:ext cx="8708072" cy="253916"/>
+          </a:xfrm>
+          <a:prstGeom prst="rect">
+            <a:avLst/>
+          </a:prstGeom>
+          <a:noFill/>
+        </p:spPr>
+        <p:txBody>
+          <a:bodyPr wrap="square" rtlCol="0">
+            <a:spAutoFit/>
+          </a:bodyPr>
+          <a:lstStyle/>
+          <a:p>
+            <a:pPr algn="ctr"/>
+            <a:r>
+              <a:rPr lang="fr-FR" sz="1050" b="1" i="1" dirty="0">
+                <a:solidFill>
+                  <a:srgbClr val="0070C0"/>
+                </a:solidFill>
+              </a:rPr>
+              <a:t>Revenue </a:t>
+            </a:r>
+            <a:r>
+              <a:rPr lang="fr-FR" sz="1050" b="1" i="1" dirty="0" err="1">
+                <a:solidFill>
+                  <a:srgbClr val="0070C0"/>
+                </a:solidFill>
+              </a:rPr>
+              <a:t>constraint</a:t>
+            </a:r>
+            <a:endParaRPr lang="fr-FR" sz="900" dirty="0"/>
+          </a:p>
+        </p:txBody>
+      </p:sp>
+      <p:sp>
+        <p:nvSpPr>
+          <p:cNvPr id="57" name="Accolade ouvrante 56"/>
+          <p:cNvSpPr/>
+          <p:nvPr/>
+        </p:nvSpPr>
+        <p:spPr>
+          <a:xfrm rot="5400000">
+            <a:off x="6769538" y="-3945559"/>
+            <a:ext cx="341766" cy="10503160"/>
+          </a:xfrm>
+          <a:prstGeom prst="leftBrace">
+            <a:avLst>
+              <a:gd name="adj1" fmla="val 23958"/>
+              <a:gd name="adj2" fmla="val 10001"/>
+            </a:avLst>
+          </a:prstGeom>
+          <a:ln>
+            <a:solidFill>
+              <a:schemeClr val="tx1"/>
+            </a:solidFill>
+          </a:ln>
+        </p:spPr>
+        <p:style>
+          <a:lnRef idx="1">
+            <a:schemeClr val="accent1"/>
+          </a:lnRef>
+          <a:fillRef idx="0">
+            <a:schemeClr val="accent1"/>
+          </a:fillRef>
+          <a:effectRef idx="0">
+            <a:schemeClr val="accent1"/>
+          </a:effectRef>
+          <a:fontRef idx="minor">
+            <a:schemeClr val="tx1"/>
+          </a:fontRef>
+        </p:style>
+        <p:txBody>
+          <a:bodyPr rtlCol="0" anchor="ctr"/>
+          <a:lstStyle/>
+          <a:p>
+            <a:pPr algn="ctr"/>
+            <a:endParaRPr lang="fr-FR"/>
+          </a:p>
+        </p:txBody>
+      </p:sp>
+      <p:cxnSp>
+        <p:nvCxnSpPr>
+          <p:cNvPr id="174" name="Connecteur en arc 173"/>
+          <p:cNvCxnSpPr>
+            <a:cxnSpLocks/>
+            <a:stCxn id="36" idx="3"/>
+            <a:endCxn id="57" idx="1"/>
+          </p:cNvCxnSpPr>
+          <p:nvPr/>
+        </p:nvCxnSpPr>
+        <p:spPr>
+          <a:xfrm>
+            <a:off x="2621902" y="311371"/>
+            <a:ext cx="8519678" cy="823767"/>
+          </a:xfrm>
+          <a:prstGeom prst="curvedConnector4">
+            <a:avLst>
+              <a:gd name="adj1" fmla="val 24342"/>
+              <a:gd name="adj2" fmla="val 1436"/>
+            </a:avLst>
+          </a:prstGeom>
+          <a:ln w="9525" cap="flat" cmpd="dbl" algn="ctr">
+            <a:solidFill>
+              <a:schemeClr val="accent5"/>
+            </a:solidFill>
+            <a:prstDash val="dash"/>
+            <a:round/>
+            <a:headEnd type="none" w="med" len="med"/>
+            <a:tailEnd type="arrow" w="med" len="med"/>
+          </a:ln>
+        </p:spPr>
+        <p:style>
+          <a:lnRef idx="0">
+            <a:scrgbClr r="0" g="0" b="0"/>
+          </a:lnRef>
+          <a:fillRef idx="0">
+            <a:scrgbClr r="0" g="0" b="0"/>
+          </a:fillRef>
+          <a:effectRef idx="0">
+            <a:scrgbClr r="0" g="0" b="0"/>
+          </a:effectRef>
+          <a:fontRef idx="minor">
+            <a:schemeClr val="tx1"/>
+          </a:fontRef>
+        </p:style>
+      </p:cxnSp>
+      <p:cxnSp>
+        <p:nvCxnSpPr>
+          <p:cNvPr id="178" name="Connecteur en arc 177"/>
+          <p:cNvCxnSpPr>
+            <a:cxnSpLocks/>
+            <a:stCxn id="36" idx="3"/>
+            <a:endCxn id="32" idx="1"/>
+          </p:cNvCxnSpPr>
+          <p:nvPr/>
+        </p:nvCxnSpPr>
+        <p:spPr>
+          <a:xfrm>
+            <a:off x="2621902" y="311371"/>
+            <a:ext cx="2328451" cy="188589"/>
+          </a:xfrm>
+          <a:prstGeom prst="curvedConnector4">
+            <a:avLst>
+              <a:gd name="adj1" fmla="val 46781"/>
+              <a:gd name="adj2" fmla="val -3824"/>
+            </a:avLst>
+          </a:prstGeom>
+          <a:ln>
+            <a:solidFill>
+              <a:srgbClr val="C00000"/>
+            </a:solidFill>
+            <a:tailEnd type="triangle"/>
+          </a:ln>
+        </p:spPr>
+        <p:style>
+          <a:lnRef idx="2">
+            <a:schemeClr val="accent2"/>
+          </a:lnRef>
+          <a:fillRef idx="0">
+            <a:schemeClr val="accent2"/>
+          </a:fillRef>
+          <a:effectRef idx="1">
+            <a:schemeClr val="accent2"/>
+          </a:effectRef>
+          <a:fontRef idx="minor">
+            <a:schemeClr val="tx1"/>
+          </a:fontRef>
+        </p:style>
+      </p:cxnSp>
+      <p:sp>
+        <p:nvSpPr>
+          <p:cNvPr id="61" name="ZoneTexte 60"/>
+          <p:cNvSpPr txBox="1"/>
+          <p:nvPr/>
+        </p:nvSpPr>
+        <p:spPr>
+          <a:xfrm>
+            <a:off x="1717194" y="648507"/>
+            <a:ext cx="6517468" cy="384721"/>
+          </a:xfrm>
+          <a:prstGeom prst="rect">
+            <a:avLst/>
+          </a:prstGeom>
+          <a:noFill/>
+        </p:spPr>
+        <p:txBody>
+          <a:bodyPr wrap="square" rtlCol="0">
+            <a:spAutoFit/>
+          </a:bodyPr>
+          <a:lstStyle/>
+          <a:p>
+            <a:pPr algn="ctr"/>
+            <a:r>
+              <a:rPr lang="fr-FR" sz="1000" b="1" dirty="0" err="1">
+                <a:solidFill>
+                  <a:srgbClr val="C00000"/>
+                </a:solidFill>
+              </a:rPr>
+              <a:t>Feed</a:t>
+            </a:r>
+            <a:r>
+              <a:rPr lang="fr-FR" sz="1000" b="1" dirty="0">
+                <a:solidFill>
+                  <a:srgbClr val="C00000"/>
+                </a:solidFill>
+              </a:rPr>
+              <a:t> </a:t>
+            </a:r>
+            <a:r>
+              <a:rPr lang="fr-FR" sz="1000" b="1" dirty="0" err="1">
+                <a:solidFill>
+                  <a:srgbClr val="C00000"/>
+                </a:solidFill>
+              </a:rPr>
+              <a:t>crops</a:t>
+            </a:r>
+            <a:r>
+              <a:rPr lang="fr-FR" sz="1000" b="1" dirty="0">
+                <a:solidFill>
+                  <a:srgbClr val="C00000"/>
+                </a:solidFill>
+              </a:rPr>
+              <a:t> substitution</a:t>
+            </a:r>
+          </a:p>
+          <a:p>
+            <a:pPr algn="ctr"/>
+            <a:r>
+              <a:rPr lang="fr-FR" sz="900" dirty="0" err="1"/>
+              <a:t>attenuated</a:t>
+            </a:r>
+            <a:r>
+              <a:rPr lang="fr-FR" sz="900" dirty="0"/>
+              <a:t> by DDGS </a:t>
+            </a:r>
+            <a:r>
+              <a:rPr lang="fr-FR" sz="900" dirty="0" err="1"/>
+              <a:t>supply</a:t>
+            </a:r>
+            <a:endParaRPr lang="fr-FR" sz="900" dirty="0"/>
+          </a:p>
+        </p:txBody>
+      </p:sp>
+      <p:sp>
+        <p:nvSpPr>
+          <p:cNvPr id="33" name="Accolade ouvrante 32"/>
+          <p:cNvSpPr/>
+          <p:nvPr/>
+        </p:nvSpPr>
+        <p:spPr>
+          <a:xfrm rot="5400000">
+            <a:off x="6707975" y="-2042983"/>
+            <a:ext cx="275868" cy="6134023"/>
+          </a:xfrm>
+          <a:prstGeom prst="leftBrace">
+            <a:avLst>
+              <a:gd name="adj1" fmla="val 23957"/>
+              <a:gd name="adj2" fmla="val 13557"/>
+            </a:avLst>
+          </a:prstGeom>
+          <a:ln>
+            <a:solidFill>
+              <a:schemeClr val="tx1"/>
+            </a:solidFill>
+          </a:ln>
+        </p:spPr>
+        <p:style>
+          <a:lnRef idx="1">
+            <a:schemeClr val="accent1"/>
+          </a:lnRef>
+          <a:fillRef idx="0">
+            <a:schemeClr val="accent1"/>
+          </a:fillRef>
+          <a:effectRef idx="0">
+            <a:schemeClr val="accent1"/>
+          </a:effectRef>
+          <a:fontRef idx="minor">
+            <a:schemeClr val="tx1"/>
+          </a:fontRef>
+        </p:style>
+        <p:txBody>
+          <a:bodyPr rtlCol="0" anchor="ctr"/>
+          <a:lstStyle/>
+          <a:p>
+            <a:pPr algn="ctr"/>
+            <a:endParaRPr lang="fr-FR"/>
+          </a:p>
+        </p:txBody>
+      </p:sp>
+      <p:sp>
+        <p:nvSpPr>
+          <p:cNvPr id="34" name="ZoneTexte 33"/>
+          <p:cNvSpPr txBox="1"/>
+          <p:nvPr/>
+        </p:nvSpPr>
+        <p:spPr>
+          <a:xfrm>
+            <a:off x="3778897" y="1033404"/>
+            <a:ext cx="6134022" cy="246221"/>
+          </a:xfrm>
+          <a:prstGeom prst="rect">
+            <a:avLst/>
+          </a:prstGeom>
+          <a:noFill/>
+        </p:spPr>
+        <p:txBody>
+          <a:bodyPr wrap="square" rtlCol="0">
+            <a:spAutoFit/>
+          </a:bodyPr>
+          <a:lstStyle/>
+          <a:p>
+            <a:pPr algn="ctr"/>
+            <a:r>
+              <a:rPr lang="fr-FR" sz="1000" b="1" i="1" dirty="0" err="1">
+                <a:solidFill>
+                  <a:srgbClr val="0070C0"/>
+                </a:solidFill>
+              </a:rPr>
+              <a:t>Biofuel</a:t>
+            </a:r>
+            <a:r>
+              <a:rPr lang="fr-FR" sz="1000" b="1" i="1" dirty="0">
+                <a:solidFill>
+                  <a:srgbClr val="0070C0"/>
+                </a:solidFill>
+              </a:rPr>
+              <a:t> </a:t>
+            </a:r>
+            <a:r>
+              <a:rPr lang="fr-FR" sz="1000" b="1" i="1" dirty="0" err="1">
+                <a:solidFill>
+                  <a:srgbClr val="0070C0"/>
+                </a:solidFill>
+              </a:rPr>
+              <a:t>feedstocks</a:t>
+            </a:r>
+            <a:r>
+              <a:rPr lang="fr-FR" sz="1000" b="1" i="1" dirty="0">
+                <a:solidFill>
+                  <a:srgbClr val="0070C0"/>
+                </a:solidFill>
+              </a:rPr>
+              <a:t> substitution</a:t>
+            </a:r>
+          </a:p>
+        </p:txBody>
+      </p:sp>
+      <p:cxnSp>
+        <p:nvCxnSpPr>
+          <p:cNvPr id="53" name="Connecteur en arc 52"/>
+          <p:cNvCxnSpPr>
+            <a:cxnSpLocks/>
+            <a:stCxn id="36" idx="3"/>
+            <a:endCxn id="33" idx="1"/>
+          </p:cNvCxnSpPr>
+          <p:nvPr/>
+        </p:nvCxnSpPr>
+        <p:spPr>
+          <a:xfrm>
+            <a:off x="2621902" y="311371"/>
+            <a:ext cx="6459430" cy="574723"/>
+          </a:xfrm>
+          <a:prstGeom prst="curvedConnector4">
+            <a:avLst>
+              <a:gd name="adj1" fmla="val 31629"/>
+              <a:gd name="adj2" fmla="val 283"/>
+            </a:avLst>
+          </a:prstGeom>
+          <a:ln w="9525" cap="flat" cmpd="dbl" algn="ctr">
+            <a:solidFill>
+              <a:schemeClr val="accent5"/>
+            </a:solidFill>
+            <a:prstDash val="dash"/>
+            <a:round/>
+            <a:headEnd type="none" w="med" len="med"/>
+            <a:tailEnd type="arrow" w="med" len="med"/>
+          </a:ln>
+        </p:spPr>
+        <p:style>
+          <a:lnRef idx="0">
+            <a:scrgbClr r="0" g="0" b="0"/>
+          </a:lnRef>
+          <a:fillRef idx="0">
+            <a:scrgbClr r="0" g="0" b="0"/>
+          </a:fillRef>
+          <a:effectRef idx="0">
+            <a:scrgbClr r="0" g="0" b="0"/>
+          </a:effectRef>
+          <a:fontRef idx="minor">
+            <a:schemeClr val="tx1"/>
+          </a:fontRef>
+        </p:style>
+      </p:cxnSp>
+      <p:grpSp>
+        <p:nvGrpSpPr>
+          <p:cNvPr id="41" name="Groupe 40">
+            <a:extLst>
+              <a:ext uri="{FF2B5EF4-FFF2-40B4-BE49-F238E27FC236}">
+                <a16:creationId xmlns:a16="http://schemas.microsoft.com/office/drawing/2014/main" id="{4B2998AE-2324-A36A-ABFB-80D96910ED30}"/>
+              </a:ext>
+            </a:extLst>
+          </p:cNvPr>
+          <p:cNvGrpSpPr/>
+          <p:nvPr/>
+        </p:nvGrpSpPr>
+        <p:grpSpPr>
+          <a:xfrm>
+            <a:off x="5661642" y="4385388"/>
+            <a:ext cx="2091997" cy="807932"/>
+            <a:chOff x="3391886" y="5556653"/>
+            <a:chExt cx="2690688" cy="1051225"/>
+          </a:xfrm>
+        </p:grpSpPr>
+        <p:sp>
+          <p:nvSpPr>
+            <p:cNvPr id="42" name="Flèche courbée vers le haut 93"/>
+            <p:cNvSpPr/>
+            <p:nvPr/>
+          </p:nvSpPr>
+          <p:spPr>
+            <a:xfrm rot="2278782">
+              <a:off x="3391886" y="6338596"/>
+              <a:ext cx="1702423" cy="253354"/>
+            </a:xfrm>
+            <a:prstGeom prst="curvedUpArrow">
+              <a:avLst/>
+            </a:prstGeom>
+            <a:solidFill>
+              <a:schemeClr val="tx1">
+                <a:lumMod val="50000"/>
+                <a:lumOff val="50000"/>
+              </a:schemeClr>
+            </a:solidFill>
+            <a:ln>
+              <a:noFill/>
+            </a:ln>
+          </p:spPr>
+          <p:style>
+            <a:lnRef idx="2">
+              <a:schemeClr val="accent1">
+                <a:shade val="50000"/>
+              </a:schemeClr>
+            </a:lnRef>
+            <a:fillRef idx="1">
+              <a:schemeClr val="accent1"/>
+            </a:fillRef>
+            <a:effectRef idx="0">
+              <a:schemeClr val="accent1"/>
+            </a:effectRef>
+            <a:fontRef idx="minor">
+              <a:schemeClr val="lt1"/>
+            </a:fontRef>
+          </p:style>
+          <p:txBody>
+            <a:bodyPr rtlCol="0" anchor="ctr"/>
+            <a:lstStyle/>
+            <a:p>
+              <a:pPr algn="ctr"/>
+              <a:endParaRPr lang="fr-FR">
+                <a:solidFill>
+                  <a:schemeClr val="tx1"/>
+                </a:solidFill>
+              </a:endParaRPr>
+            </a:p>
+          </p:txBody>
+        </p:sp>
+        <p:sp useBgFill="1">
+          <p:nvSpPr>
+            <p:cNvPr id="43" name="Ellipse 42"/>
+            <p:cNvSpPr/>
+            <p:nvPr/>
+          </p:nvSpPr>
+          <p:spPr>
+            <a:xfrm>
+              <a:off x="3914306" y="5565598"/>
+              <a:ext cx="1723697" cy="1042280"/>
+            </a:xfrm>
+            <a:prstGeom prst="ellipse">
+              <a:avLst/>
+            </a:prstGeom>
+            <a:ln>
+              <a:solidFill>
+                <a:schemeClr val="bg2">
+                  <a:lumMod val="75000"/>
+                </a:schemeClr>
+              </a:solidFill>
+              <a:prstDash val="dashDot"/>
+            </a:ln>
+          </p:spPr>
+          <p:style>
+            <a:lnRef idx="2">
+              <a:schemeClr val="accent1">
+                <a:shade val="50000"/>
+              </a:schemeClr>
+            </a:lnRef>
+            <a:fillRef idx="1">
+              <a:schemeClr val="accent1"/>
+            </a:fillRef>
+            <a:effectRef idx="0">
+              <a:schemeClr val="accent1"/>
+            </a:effectRef>
+            <a:fontRef idx="minor">
+              <a:schemeClr val="lt1"/>
+            </a:fontRef>
+          </p:style>
+          <p:txBody>
+            <a:bodyPr rtlCol="0" anchor="ctr"/>
+            <a:lstStyle/>
+            <a:p>
+              <a:pPr algn="ctr"/>
+              <a:r>
+                <a:rPr lang="fr-FR" sz="1000" b="1" dirty="0">
+                  <a:solidFill>
+                    <a:schemeClr val="accent1">
+                      <a:lumMod val="60000"/>
+                      <a:lumOff val="40000"/>
+                    </a:schemeClr>
+                  </a:solidFill>
+                </a:rPr>
+                <a:t>Co-</a:t>
+              </a:r>
+              <a:r>
+                <a:rPr lang="fr-FR" sz="1000" b="1" dirty="0" err="1">
+                  <a:solidFill>
+                    <a:schemeClr val="accent1">
+                      <a:lumMod val="60000"/>
+                      <a:lumOff val="40000"/>
+                    </a:schemeClr>
+                  </a:solidFill>
+                </a:rPr>
+                <a:t>product</a:t>
+              </a:r>
+              <a:r>
+                <a:rPr lang="fr-FR" sz="1000" b="1" dirty="0">
+                  <a:solidFill>
+                    <a:schemeClr val="accent1">
+                      <a:lumMod val="60000"/>
+                      <a:lumOff val="40000"/>
+                    </a:schemeClr>
+                  </a:solidFill>
+                </a:rPr>
+                <a:t> </a:t>
+              </a:r>
+            </a:p>
+            <a:p>
+              <a:pPr algn="ctr"/>
+              <a:r>
+                <a:rPr lang="fr-FR" sz="1000" b="1" dirty="0" err="1">
+                  <a:solidFill>
+                    <a:schemeClr val="accent1">
+                      <a:lumMod val="60000"/>
+                      <a:lumOff val="40000"/>
+                    </a:schemeClr>
+                  </a:solidFill>
+                </a:rPr>
+                <a:t>supply</a:t>
+              </a:r>
+              <a:endParaRPr lang="fr-FR" sz="1000" b="1" dirty="0">
+                <a:solidFill>
+                  <a:schemeClr val="accent1">
+                    <a:lumMod val="60000"/>
+                    <a:lumOff val="40000"/>
+                  </a:schemeClr>
+                </a:solidFill>
+              </a:endParaRPr>
+            </a:p>
+            <a:p>
+              <a:pPr algn="ctr"/>
+              <a:r>
+                <a:rPr lang="fr-FR" sz="600" b="1" dirty="0">
+                  <a:solidFill>
+                    <a:schemeClr val="tx1">
+                      <a:lumMod val="65000"/>
+                      <a:lumOff val="35000"/>
+                    </a:schemeClr>
+                  </a:solidFill>
+                </a:rPr>
+                <a:t>---</a:t>
+              </a:r>
+            </a:p>
+            <a:p>
+              <a:pPr algn="ctr"/>
+              <a:r>
+                <a:rPr lang="fr-FR" sz="1000" b="1" dirty="0" err="1">
+                  <a:solidFill>
+                    <a:schemeClr val="accent2">
+                      <a:lumMod val="60000"/>
+                      <a:lumOff val="40000"/>
+                    </a:schemeClr>
+                  </a:solidFill>
+                </a:rPr>
+                <a:t>Oil</a:t>
+              </a:r>
+              <a:r>
+                <a:rPr lang="fr-FR" sz="1000" b="1" dirty="0">
+                  <a:solidFill>
+                    <a:schemeClr val="accent2">
+                      <a:lumMod val="60000"/>
+                      <a:lumOff val="40000"/>
+                    </a:schemeClr>
+                  </a:solidFill>
+                </a:rPr>
+                <a:t> </a:t>
+              </a:r>
+              <a:r>
+                <a:rPr lang="fr-FR" sz="1000" b="1" dirty="0" err="1">
+                  <a:solidFill>
+                    <a:schemeClr val="accent2">
+                      <a:lumMod val="60000"/>
+                      <a:lumOff val="40000"/>
+                    </a:schemeClr>
+                  </a:solidFill>
+                </a:rPr>
+                <a:t>crops</a:t>
+              </a:r>
+              <a:r>
+                <a:rPr lang="fr-FR" sz="1000" b="1" dirty="0">
+                  <a:solidFill>
+                    <a:schemeClr val="accent2">
+                      <a:lumMod val="60000"/>
+                      <a:lumOff val="40000"/>
+                    </a:schemeClr>
+                  </a:solidFill>
+                </a:rPr>
+                <a:t> </a:t>
+              </a:r>
+            </a:p>
+            <a:p>
+              <a:pPr algn="ctr"/>
+              <a:r>
+                <a:rPr lang="fr-FR" sz="1000" b="1" dirty="0">
+                  <a:solidFill>
+                    <a:schemeClr val="accent2">
+                      <a:lumMod val="60000"/>
+                      <a:lumOff val="40000"/>
+                    </a:schemeClr>
+                  </a:solidFill>
+                </a:rPr>
+                <a:t>substitution</a:t>
+              </a:r>
+            </a:p>
+          </p:txBody>
+        </p:sp>
+        <p:sp>
+          <p:nvSpPr>
+            <p:cNvPr id="45" name="Flèche courbée vers le haut 29"/>
+            <p:cNvSpPr/>
+            <p:nvPr/>
+          </p:nvSpPr>
+          <p:spPr>
+            <a:xfrm rot="12937591">
+              <a:off x="4380151" y="5556653"/>
+              <a:ext cx="1702423" cy="253354"/>
+            </a:xfrm>
+            <a:prstGeom prst="curvedUpArrow">
+              <a:avLst/>
+            </a:prstGeom>
+            <a:solidFill>
+              <a:schemeClr val="tx1">
+                <a:lumMod val="50000"/>
+                <a:lumOff val="50000"/>
+              </a:schemeClr>
+            </a:solidFill>
+            <a:ln>
+              <a:noFill/>
+            </a:ln>
+          </p:spPr>
+          <p:style>
+            <a:lnRef idx="2">
+              <a:schemeClr val="accent1">
+                <a:shade val="50000"/>
+              </a:schemeClr>
+            </a:lnRef>
+            <a:fillRef idx="1">
+              <a:schemeClr val="accent1"/>
+            </a:fillRef>
+            <a:effectRef idx="0">
+              <a:schemeClr val="accent1"/>
+            </a:effectRef>
+            <a:fontRef idx="minor">
+              <a:schemeClr val="lt1"/>
+            </a:fontRef>
+          </p:style>
+          <p:txBody>
+            <a:bodyPr rtlCol="0" anchor="ctr"/>
+            <a:lstStyle/>
+            <a:p>
+              <a:pPr algn="ctr"/>
+              <a:endParaRPr lang="fr-FR">
+                <a:solidFill>
+                  <a:schemeClr val="tx1"/>
+                </a:solidFill>
+              </a:endParaRPr>
+            </a:p>
+          </p:txBody>
+        </p:sp>
+      </p:grpSp>
+      <p:pic>
+        <p:nvPicPr>
+          <p:cNvPr id="51" name="Image 50" descr="Une image contenant texte, capture d’écran, diagramme, Tracé&#10;&#10;Description générée automatiquement">
+            <a:extLst>
+              <a:ext uri="{FF2B5EF4-FFF2-40B4-BE49-F238E27FC236}">
+                <a16:creationId xmlns:a16="http://schemas.microsoft.com/office/drawing/2014/main" id="{5CAB7067-76B2-3FA0-0403-EA2CF79EA34B}"/>
+              </a:ext>
+            </a:extLst>
+          </p:cNvPr>
+          <p:cNvPicPr>
+            <a:picLocks noChangeAspect="1"/>
+          </p:cNvPicPr>
+          <p:nvPr/>
+        </p:nvPicPr>
+        <p:blipFill>
+          <a:blip r:embed="rId2" cstate="print">
+            <a:extLst>
+              <a:ext uri="{28A0092B-C50C-407E-A947-70E740481C1C}">
+                <a14:useLocalDpi xmlns:a14="http://schemas.microsoft.com/office/drawing/2010/main" val="0"/>
+              </a:ext>
+            </a:extLst>
+          </a:blip>
+          <a:stretch>
+            <a:fillRect/>
+          </a:stretch>
+        </p:blipFill>
+        <p:spPr>
+          <a:xfrm>
+            <a:off x="9797928" y="1752370"/>
+            <a:ext cx="2286005" cy="1371603"/>
+          </a:xfrm>
+          <a:prstGeom prst="rect">
+            <a:avLst/>
+          </a:prstGeom>
+        </p:spPr>
+      </p:pic>
+      <p:pic>
+        <p:nvPicPr>
+          <p:cNvPr id="55" name="Image 54" descr="Une image contenant texte, ligne, diagramme, capture d’écran&#10;&#10;Description générée automatiquement">
+            <a:extLst>
+              <a:ext uri="{FF2B5EF4-FFF2-40B4-BE49-F238E27FC236}">
+                <a16:creationId xmlns:a16="http://schemas.microsoft.com/office/drawing/2014/main" id="{DA187E9F-21E7-456E-CB3C-73F98199493F}"/>
+              </a:ext>
+            </a:extLst>
+          </p:cNvPr>
+          <p:cNvPicPr>
+            <a:picLocks noChangeAspect="1"/>
+          </p:cNvPicPr>
+          <p:nvPr/>
+        </p:nvPicPr>
+        <p:blipFill>
+          <a:blip r:embed="rId3" cstate="print">
+            <a:extLst>
+              <a:ext uri="{28A0092B-C50C-407E-A947-70E740481C1C}">
+                <a14:useLocalDpi xmlns:a14="http://schemas.microsoft.com/office/drawing/2010/main" val="0"/>
+              </a:ext>
+            </a:extLst>
+          </a:blip>
+          <a:stretch>
+            <a:fillRect/>
+          </a:stretch>
+        </p:blipFill>
+        <p:spPr>
+          <a:xfrm>
+            <a:off x="7653276" y="1752990"/>
+            <a:ext cx="2286005" cy="1371603"/>
+          </a:xfrm>
+          <a:prstGeom prst="rect">
+            <a:avLst/>
+          </a:prstGeom>
+        </p:spPr>
+      </p:pic>
+      <p:pic>
+        <p:nvPicPr>
+          <p:cNvPr id="58" name="Image 57" descr="Une image contenant texte, capture d’écran, ligne, diagramme&#10;&#10;Description générée automatiquement">
+            <a:extLst>
+              <a:ext uri="{FF2B5EF4-FFF2-40B4-BE49-F238E27FC236}">
+                <a16:creationId xmlns:a16="http://schemas.microsoft.com/office/drawing/2014/main" id="{0254ABF5-CB8F-5934-2D5E-33788432AE30}"/>
+              </a:ext>
+            </a:extLst>
+          </p:cNvPr>
+          <p:cNvPicPr>
+            <a:picLocks noChangeAspect="1"/>
+          </p:cNvPicPr>
+          <p:nvPr/>
+        </p:nvPicPr>
+        <p:blipFill>
+          <a:blip r:embed="rId4" cstate="print">
+            <a:extLst>
+              <a:ext uri="{28A0092B-C50C-407E-A947-70E740481C1C}">
+                <a14:useLocalDpi xmlns:a14="http://schemas.microsoft.com/office/drawing/2010/main" val="0"/>
+              </a:ext>
+            </a:extLst>
+          </a:blip>
+          <a:stretch>
+            <a:fillRect/>
+          </a:stretch>
+        </p:blipFill>
+        <p:spPr>
+          <a:xfrm>
+            <a:off x="7686069" y="2769372"/>
+            <a:ext cx="2286005" cy="1371603"/>
+          </a:xfrm>
+          <a:prstGeom prst="rect">
+            <a:avLst/>
+          </a:prstGeom>
+        </p:spPr>
+      </p:pic>
+      <p:pic>
+        <p:nvPicPr>
+          <p:cNvPr id="60" name="Image 59" descr="Une image contenant texte, capture d’écran, ligne, diagramme&#10;&#10;Description générée automatiquement">
+            <a:extLst>
+              <a:ext uri="{FF2B5EF4-FFF2-40B4-BE49-F238E27FC236}">
+                <a16:creationId xmlns:a16="http://schemas.microsoft.com/office/drawing/2014/main" id="{92D2F2D0-0DE2-AF88-9F71-0B71CE798081}"/>
+              </a:ext>
+            </a:extLst>
+          </p:cNvPr>
+          <p:cNvPicPr>
+            <a:picLocks noChangeAspect="1"/>
+          </p:cNvPicPr>
+          <p:nvPr/>
+        </p:nvPicPr>
+        <p:blipFill>
+          <a:blip r:embed="rId5" cstate="print">
+            <a:extLst>
+              <a:ext uri="{28A0092B-C50C-407E-A947-70E740481C1C}">
+                <a14:useLocalDpi xmlns:a14="http://schemas.microsoft.com/office/drawing/2010/main" val="0"/>
+              </a:ext>
+            </a:extLst>
+          </a:blip>
+          <a:stretch>
+            <a:fillRect/>
+          </a:stretch>
+        </p:blipFill>
+        <p:spPr>
+          <a:xfrm>
+            <a:off x="5470740" y="1745315"/>
+            <a:ext cx="2286005" cy="1371603"/>
+          </a:xfrm>
+          <a:prstGeom prst="rect">
+            <a:avLst/>
+          </a:prstGeom>
+        </p:spPr>
+      </p:pic>
+      <p:pic>
+        <p:nvPicPr>
+          <p:cNvPr id="62" name="Image 61" descr="Une image contenant capture d’écran, diagramme, texte, Tracé&#10;&#10;Description générée automatiquement">
+            <a:extLst>
+              <a:ext uri="{FF2B5EF4-FFF2-40B4-BE49-F238E27FC236}">
+                <a16:creationId xmlns:a16="http://schemas.microsoft.com/office/drawing/2014/main" id="{7189D902-F122-10B0-B146-3A5E7BCE1611}"/>
+              </a:ext>
+            </a:extLst>
+          </p:cNvPr>
+          <p:cNvPicPr>
+            <a:picLocks noChangeAspect="1"/>
+          </p:cNvPicPr>
+          <p:nvPr/>
+        </p:nvPicPr>
+        <p:blipFill>
+          <a:blip r:embed="rId6" cstate="print">
+            <a:extLst>
+              <a:ext uri="{28A0092B-C50C-407E-A947-70E740481C1C}">
+                <a14:useLocalDpi xmlns:a14="http://schemas.microsoft.com/office/drawing/2010/main" val="0"/>
+              </a:ext>
+            </a:extLst>
+          </a:blip>
+          <a:stretch>
+            <a:fillRect/>
+          </a:stretch>
+        </p:blipFill>
+        <p:spPr>
+          <a:xfrm>
+            <a:off x="5454298" y="2771511"/>
+            <a:ext cx="2286005" cy="1371603"/>
+          </a:xfrm>
+          <a:prstGeom prst="rect">
+            <a:avLst/>
+          </a:prstGeom>
+        </p:spPr>
+      </p:pic>
+      <p:pic>
+        <p:nvPicPr>
+          <p:cNvPr id="63" name="Image 62" descr="Une image contenant texte, capture d’écran, diagramme, ligne&#10;&#10;Description générée automatiquement">
+            <a:extLst>
+              <a:ext uri="{FF2B5EF4-FFF2-40B4-BE49-F238E27FC236}">
+                <a16:creationId xmlns:a16="http://schemas.microsoft.com/office/drawing/2014/main" id="{7A195413-D3CB-6496-8FA1-37741929BDEF}"/>
+              </a:ext>
+            </a:extLst>
+          </p:cNvPr>
+          <p:cNvPicPr>
+            <a:picLocks noChangeAspect="1"/>
+          </p:cNvPicPr>
+          <p:nvPr/>
+        </p:nvPicPr>
+        <p:blipFill>
+          <a:blip r:embed="rId7" cstate="print">
+            <a:extLst>
+              <a:ext uri="{28A0092B-C50C-407E-A947-70E740481C1C}">
+                <a14:useLocalDpi xmlns:a14="http://schemas.microsoft.com/office/drawing/2010/main" val="0"/>
+              </a:ext>
+            </a:extLst>
+          </a:blip>
+          <a:stretch>
+            <a:fillRect/>
+          </a:stretch>
+        </p:blipFill>
+        <p:spPr>
+          <a:xfrm>
+            <a:off x="3408843" y="1733752"/>
+            <a:ext cx="2286005" cy="1371603"/>
+          </a:xfrm>
+          <a:prstGeom prst="rect">
+            <a:avLst/>
+          </a:prstGeom>
+        </p:spPr>
+      </p:pic>
+      <p:pic>
+        <p:nvPicPr>
+          <p:cNvPr id="64" name="Image 63" descr="Une image contenant texte, diagramme, capture d’écran, ligne&#10;&#10;Description générée automatiquement">
+            <a:extLst>
+              <a:ext uri="{FF2B5EF4-FFF2-40B4-BE49-F238E27FC236}">
+                <a16:creationId xmlns:a16="http://schemas.microsoft.com/office/drawing/2014/main" id="{E9A16C79-7BBA-3489-3D41-A756A8E9DC11}"/>
+              </a:ext>
+            </a:extLst>
+          </p:cNvPr>
+          <p:cNvPicPr>
+            <a:picLocks noChangeAspect="1"/>
+          </p:cNvPicPr>
+          <p:nvPr/>
+        </p:nvPicPr>
+        <p:blipFill>
+          <a:blip r:embed="rId8" cstate="print">
+            <a:extLst>
+              <a:ext uri="{28A0092B-C50C-407E-A947-70E740481C1C}">
+                <a14:useLocalDpi xmlns:a14="http://schemas.microsoft.com/office/drawing/2010/main" val="0"/>
+              </a:ext>
+            </a:extLst>
+          </a:blip>
+          <a:stretch>
+            <a:fillRect/>
+          </a:stretch>
+        </p:blipFill>
+        <p:spPr>
+          <a:xfrm>
+            <a:off x="3392401" y="2751847"/>
+            <a:ext cx="2286005" cy="1371603"/>
+          </a:xfrm>
+          <a:prstGeom prst="rect">
+            <a:avLst/>
+          </a:prstGeom>
+        </p:spPr>
+      </p:pic>
+      <p:pic>
+        <p:nvPicPr>
+          <p:cNvPr id="65" name="Image 64" descr="Une image contenant texte, capture d’écran, ligne, diagramme&#10;&#10;Description générée automatiquement">
+            <a:extLst>
+              <a:ext uri="{FF2B5EF4-FFF2-40B4-BE49-F238E27FC236}">
+                <a16:creationId xmlns:a16="http://schemas.microsoft.com/office/drawing/2014/main" id="{2B8C7244-5E25-1EC3-AF84-12E36A7431AE}"/>
+              </a:ext>
+            </a:extLst>
+          </p:cNvPr>
+          <p:cNvPicPr>
+            <a:picLocks noChangeAspect="1"/>
+          </p:cNvPicPr>
+          <p:nvPr/>
+        </p:nvPicPr>
+        <p:blipFill>
+          <a:blip r:embed="rId9" cstate="print">
+            <a:extLst>
+              <a:ext uri="{28A0092B-C50C-407E-A947-70E740481C1C}">
+                <a14:useLocalDpi xmlns:a14="http://schemas.microsoft.com/office/drawing/2010/main" val="0"/>
+              </a:ext>
+            </a:extLst>
+          </a:blip>
+          <a:stretch>
+            <a:fillRect/>
+          </a:stretch>
+        </p:blipFill>
+        <p:spPr>
+          <a:xfrm>
+            <a:off x="3410646" y="3760349"/>
+            <a:ext cx="2286005" cy="1371603"/>
+          </a:xfrm>
+          <a:prstGeom prst="rect">
+            <a:avLst/>
+          </a:prstGeom>
+        </p:spPr>
+      </p:pic>
+      <p:pic>
+        <p:nvPicPr>
+          <p:cNvPr id="66" name="Image 65" descr="Une image contenant diagramme, texte, ligne, capture d’écran&#10;&#10;Description générée automatiquement">
+            <a:extLst>
+              <a:ext uri="{FF2B5EF4-FFF2-40B4-BE49-F238E27FC236}">
+                <a16:creationId xmlns:a16="http://schemas.microsoft.com/office/drawing/2014/main" id="{469C0EB1-6BE3-4766-F26D-B41C23DA4A63}"/>
+              </a:ext>
+            </a:extLst>
+          </p:cNvPr>
+          <p:cNvPicPr>
+            <a:picLocks noChangeAspect="1"/>
+          </p:cNvPicPr>
+          <p:nvPr/>
+        </p:nvPicPr>
+        <p:blipFill>
+          <a:blip r:embed="rId10" cstate="print">
+            <a:extLst>
+              <a:ext uri="{28A0092B-C50C-407E-A947-70E740481C1C}">
+                <a14:useLocalDpi xmlns:a14="http://schemas.microsoft.com/office/drawing/2010/main" val="0"/>
+              </a:ext>
+            </a:extLst>
+          </a:blip>
+          <a:stretch>
+            <a:fillRect/>
+          </a:stretch>
+        </p:blipFill>
+        <p:spPr>
+          <a:xfrm>
+            <a:off x="3414072" y="4778467"/>
+            <a:ext cx="2286005" cy="1371603"/>
+          </a:xfrm>
+          <a:prstGeom prst="rect">
+            <a:avLst/>
+          </a:prstGeom>
+        </p:spPr>
+      </p:pic>
+      <p:pic>
+        <p:nvPicPr>
+          <p:cNvPr id="67" name="Image 66">
+            <a:extLst>
+              <a:ext uri="{FF2B5EF4-FFF2-40B4-BE49-F238E27FC236}">
+                <a16:creationId xmlns:a16="http://schemas.microsoft.com/office/drawing/2014/main" id="{3A574D19-8F2D-C547-75AB-88C7BAB768ED}"/>
+              </a:ext>
+            </a:extLst>
+          </p:cNvPr>
+          <p:cNvPicPr>
+            <a:picLocks noChangeAspect="1"/>
+          </p:cNvPicPr>
+          <p:nvPr/>
+        </p:nvPicPr>
+        <p:blipFill>
+          <a:blip r:embed="rId11" cstate="print">
+            <a:extLst>
+              <a:ext uri="{28A0092B-C50C-407E-A947-70E740481C1C}">
+                <a14:useLocalDpi xmlns:a14="http://schemas.microsoft.com/office/drawing/2010/main" val="0"/>
+              </a:ext>
+            </a:extLst>
+          </a:blip>
+          <a:stretch>
+            <a:fillRect/>
+          </a:stretch>
+        </p:blipFill>
+        <p:spPr>
+          <a:xfrm>
+            <a:off x="1355010" y="1733796"/>
+            <a:ext cx="2286005" cy="1371603"/>
+          </a:xfrm>
+          <a:prstGeom prst="rect">
+            <a:avLst/>
+          </a:prstGeom>
+        </p:spPr>
+      </p:pic>
+      <p:pic>
+        <p:nvPicPr>
+          <p:cNvPr id="69" name="Image 68" descr="Une image contenant texte, capture d’écran, diagramme, Tracé&#10;&#10;Description générée automatiquement">
+            <a:extLst>
+              <a:ext uri="{FF2B5EF4-FFF2-40B4-BE49-F238E27FC236}">
+                <a16:creationId xmlns:a16="http://schemas.microsoft.com/office/drawing/2014/main" id="{22CEADCA-0D29-DCC2-EDC3-9AAF3F9C84AC}"/>
+              </a:ext>
+            </a:extLst>
+          </p:cNvPr>
+          <p:cNvPicPr>
+            <a:picLocks noChangeAspect="1"/>
+          </p:cNvPicPr>
+          <p:nvPr/>
+        </p:nvPicPr>
+        <p:blipFill>
+          <a:blip r:embed="rId12" cstate="print">
+            <a:extLst>
+              <a:ext uri="{28A0092B-C50C-407E-A947-70E740481C1C}">
+                <a14:useLocalDpi xmlns:a14="http://schemas.microsoft.com/office/drawing/2010/main" val="0"/>
+              </a:ext>
+            </a:extLst>
+          </a:blip>
+          <a:stretch>
+            <a:fillRect/>
+          </a:stretch>
+        </p:blipFill>
+        <p:spPr>
+          <a:xfrm>
+            <a:off x="7025804" y="5685463"/>
+            <a:ext cx="2286005" cy="1371603"/>
+          </a:xfrm>
+          <a:prstGeom prst="rect">
+            <a:avLst/>
+          </a:prstGeom>
+        </p:spPr>
+      </p:pic>
+      <p:pic>
+        <p:nvPicPr>
+          <p:cNvPr id="71" name="Image 70" descr="Une image contenant texte, diagramme, ligne, capture d’écran&#10;&#10;Description générée automatiquement">
+            <a:extLst>
+              <a:ext uri="{FF2B5EF4-FFF2-40B4-BE49-F238E27FC236}">
+                <a16:creationId xmlns:a16="http://schemas.microsoft.com/office/drawing/2014/main" id="{6CD2EA21-D9B0-FE97-543E-FF45B2945333}"/>
+              </a:ext>
+            </a:extLst>
+          </p:cNvPr>
+          <p:cNvPicPr>
+            <a:picLocks noChangeAspect="1"/>
+          </p:cNvPicPr>
+          <p:nvPr/>
+        </p:nvPicPr>
+        <p:blipFill>
+          <a:blip r:embed="rId13" cstate="print">
+            <a:extLst>
+              <a:ext uri="{28A0092B-C50C-407E-A947-70E740481C1C}">
+                <a14:useLocalDpi xmlns:a14="http://schemas.microsoft.com/office/drawing/2010/main" val="0"/>
+              </a:ext>
+            </a:extLst>
+          </a:blip>
+          <a:stretch>
+            <a:fillRect/>
+          </a:stretch>
+        </p:blipFill>
+        <p:spPr>
+          <a:xfrm>
+            <a:off x="9801711" y="5685463"/>
+            <a:ext cx="2286005" cy="1371603"/>
+          </a:xfrm>
+          <a:prstGeom prst="rect">
+            <a:avLst/>
+          </a:prstGeom>
+        </p:spPr>
+      </p:pic>
+      <p:sp>
+        <p:nvSpPr>
+          <p:cNvPr id="76" name="Rectangle : coins arrondis 75">
+            <a:extLst>
+              <a:ext uri="{FF2B5EF4-FFF2-40B4-BE49-F238E27FC236}">
+                <a16:creationId xmlns:a16="http://schemas.microsoft.com/office/drawing/2014/main" id="{0D70D76B-8077-18F5-FA1B-C4852E00F52F}"/>
+              </a:ext>
+            </a:extLst>
+          </p:cNvPr>
+          <p:cNvSpPr/>
+          <p:nvPr/>
+        </p:nvSpPr>
+        <p:spPr>
+          <a:xfrm>
+            <a:off x="7368427" y="5480448"/>
+            <a:ext cx="1859651" cy="194383"/>
+          </a:xfrm>
+          <a:prstGeom prst="roundRect">
+            <a:avLst/>
+          </a:prstGeom>
+          <a:solidFill>
+            <a:schemeClr val="bg2"/>
+          </a:solidFill>
+          <a:ln>
+            <a:solidFill>
+              <a:schemeClr val="bg1"/>
+            </a:solidFill>
+          </a:ln>
+        </p:spPr>
+        <p:style>
+          <a:lnRef idx="2">
+            <a:schemeClr val="accent6"/>
+          </a:lnRef>
+          <a:fillRef idx="1">
+            <a:schemeClr val="lt1"/>
+          </a:fillRef>
+          <a:effectRef idx="0">
+            <a:schemeClr val="accent6"/>
+          </a:effectRef>
+          <a:fontRef idx="minor">
+            <a:schemeClr val="dk1"/>
+          </a:fontRef>
+        </p:style>
+        <p:txBody>
+          <a:bodyPr rtlCol="0" anchor="ctr"/>
+          <a:lstStyle/>
+          <a:p>
+            <a:pPr algn="ctr"/>
+            <a:r>
+              <a:rPr lang="fr-FR" sz="1200" dirty="0"/>
+              <a:t>Type 3</a:t>
+            </a:r>
+            <a:endParaRPr lang="fr-BE" sz="1200" dirty="0"/>
+          </a:p>
+        </p:txBody>
+      </p:sp>
+      <p:sp>
+        <p:nvSpPr>
+          <p:cNvPr id="77" name="Rectangle : coins arrondis 76">
+            <a:extLst>
+              <a:ext uri="{FF2B5EF4-FFF2-40B4-BE49-F238E27FC236}">
+                <a16:creationId xmlns:a16="http://schemas.microsoft.com/office/drawing/2014/main" id="{E469FF62-D374-886F-7F13-D89020C84F31}"/>
+              </a:ext>
+            </a:extLst>
+          </p:cNvPr>
+          <p:cNvSpPr/>
+          <p:nvPr/>
+        </p:nvSpPr>
+        <p:spPr>
+          <a:xfrm>
+            <a:off x="10162211" y="5480447"/>
+            <a:ext cx="1859651" cy="194383"/>
+          </a:xfrm>
+          <a:prstGeom prst="roundRect">
+            <a:avLst/>
+          </a:prstGeom>
+          <a:solidFill>
+            <a:schemeClr val="bg2"/>
+          </a:solidFill>
+          <a:ln>
+            <a:solidFill>
+              <a:schemeClr val="bg1"/>
+            </a:solidFill>
+          </a:ln>
+        </p:spPr>
+        <p:style>
+          <a:lnRef idx="2">
+            <a:schemeClr val="accent6"/>
+          </a:lnRef>
+          <a:fillRef idx="1">
+            <a:schemeClr val="lt1"/>
+          </a:fillRef>
+          <a:effectRef idx="0">
+            <a:schemeClr val="accent6"/>
+          </a:effectRef>
+          <a:fontRef idx="minor">
+            <a:schemeClr val="dk1"/>
+          </a:fontRef>
+        </p:style>
+        <p:txBody>
+          <a:bodyPr rtlCol="0" anchor="ctr"/>
+          <a:lstStyle/>
+          <a:p>
+            <a:pPr algn="ctr"/>
+            <a:r>
+              <a:rPr lang="fr-FR" sz="1200" dirty="0"/>
+              <a:t>Type 6</a:t>
+            </a:r>
+            <a:endParaRPr lang="fr-BE" sz="1200" dirty="0"/>
+          </a:p>
+        </p:txBody>
+      </p:sp>
+      <p:pic>
+        <p:nvPicPr>
+          <p:cNvPr id="78" name="Image 77">
+            <a:extLst>
+              <a:ext uri="{FF2B5EF4-FFF2-40B4-BE49-F238E27FC236}">
+                <a16:creationId xmlns:a16="http://schemas.microsoft.com/office/drawing/2014/main" id="{69F43619-F709-32C4-1EBC-C68E4CAE8702}"/>
+              </a:ext>
+            </a:extLst>
+          </p:cNvPr>
+          <p:cNvPicPr>
+            <a:picLocks noChangeAspect="1"/>
+          </p:cNvPicPr>
+          <p:nvPr/>
+        </p:nvPicPr>
+        <p:blipFill>
+          <a:blip r:embed="rId14">
+            <a:extLst>
+              <a:ext uri="{28A0092B-C50C-407E-A947-70E740481C1C}">
+                <a14:useLocalDpi xmlns:a14="http://schemas.microsoft.com/office/drawing/2010/main" val="0"/>
+              </a:ext>
+            </a:extLst>
+          </a:blip>
+          <a:stretch>
+            <a:fillRect/>
+          </a:stretch>
+        </p:blipFill>
+        <p:spPr>
+          <a:xfrm>
+            <a:off x="1747262" y="6067032"/>
+            <a:ext cx="3581710" cy="358171"/>
+          </a:xfrm>
+          <a:prstGeom prst="rect">
+            <a:avLst/>
+          </a:prstGeom>
+        </p:spPr>
+      </p:pic>
+      <p:pic>
+        <p:nvPicPr>
+          <p:cNvPr id="81" name="Image 80">
+            <a:extLst>
+              <a:ext uri="{FF2B5EF4-FFF2-40B4-BE49-F238E27FC236}">
+                <a16:creationId xmlns:a16="http://schemas.microsoft.com/office/drawing/2014/main" id="{8EB9C850-5510-1933-6FDF-8D0DA1278926}"/>
+              </a:ext>
+            </a:extLst>
+          </p:cNvPr>
+          <p:cNvPicPr>
+            <a:picLocks noChangeAspect="1"/>
+          </p:cNvPicPr>
+          <p:nvPr/>
+        </p:nvPicPr>
+        <p:blipFill>
+          <a:blip r:embed="rId15">
+            <a:extLst>
+              <a:ext uri="{28A0092B-C50C-407E-A947-70E740481C1C}">
+                <a14:useLocalDpi xmlns:a14="http://schemas.microsoft.com/office/drawing/2010/main" val="0"/>
+              </a:ext>
+            </a:extLst>
+          </a:blip>
+          <a:stretch>
+            <a:fillRect/>
+          </a:stretch>
+        </p:blipFill>
+        <p:spPr>
+          <a:xfrm>
+            <a:off x="1745722" y="6425247"/>
+            <a:ext cx="4655078" cy="374472"/>
+          </a:xfrm>
+          <a:prstGeom prst="rect">
+            <a:avLst/>
+          </a:prstGeom>
+        </p:spPr>
+      </p:pic>
+      <p:sp>
+        <p:nvSpPr>
+          <p:cNvPr id="7" name="Rectangle : coins arrondis 6">
+            <a:extLst>
+              <a:ext uri="{FF2B5EF4-FFF2-40B4-BE49-F238E27FC236}">
+                <a16:creationId xmlns:a16="http://schemas.microsoft.com/office/drawing/2014/main" id="{E01C0012-5748-F2ED-8F5C-31BE0255D80D}"/>
+              </a:ext>
+            </a:extLst>
+          </p:cNvPr>
+          <p:cNvSpPr/>
+          <p:nvPr/>
+        </p:nvSpPr>
+        <p:spPr>
+          <a:xfrm>
+            <a:off x="3772129" y="1565781"/>
+            <a:ext cx="1859651" cy="194383"/>
+          </a:xfrm>
+          <a:prstGeom prst="roundRect">
+            <a:avLst/>
+          </a:prstGeom>
+          <a:solidFill>
+            <a:schemeClr val="bg2"/>
+          </a:solidFill>
+          <a:ln>
+            <a:solidFill>
+              <a:schemeClr val="bg1"/>
+            </a:solidFill>
+          </a:ln>
+        </p:spPr>
+        <p:style>
+          <a:lnRef idx="2">
+            <a:schemeClr val="accent6"/>
+          </a:lnRef>
+          <a:fillRef idx="1">
+            <a:schemeClr val="lt1"/>
+          </a:fillRef>
+          <a:effectRef idx="0">
+            <a:schemeClr val="accent6"/>
+          </a:effectRef>
+          <a:fontRef idx="minor">
+            <a:schemeClr val="dk1"/>
+          </a:fontRef>
+        </p:style>
+        <p:txBody>
+          <a:bodyPr rtlCol="0" anchor="ctr"/>
+          <a:lstStyle/>
+          <a:p>
+            <a:pPr algn="ctr"/>
+            <a:r>
+              <a:rPr lang="fr-FR" sz="1200" dirty="0"/>
+              <a:t>Type 1</a:t>
+            </a:r>
+            <a:endParaRPr lang="fr-BE" sz="1200" dirty="0"/>
+          </a:p>
+        </p:txBody>
+      </p:sp>
+      <p:sp>
+        <p:nvSpPr>
+          <p:cNvPr id="9" name="Rectangle : coins arrondis 8">
+            <a:extLst>
+              <a:ext uri="{FF2B5EF4-FFF2-40B4-BE49-F238E27FC236}">
+                <a16:creationId xmlns:a16="http://schemas.microsoft.com/office/drawing/2014/main" id="{C3A94DB5-4C30-00F2-5412-446178F8CB5B}"/>
+              </a:ext>
+            </a:extLst>
+          </p:cNvPr>
+          <p:cNvSpPr/>
+          <p:nvPr/>
+        </p:nvSpPr>
+        <p:spPr>
+          <a:xfrm>
+            <a:off x="5826418" y="1569367"/>
+            <a:ext cx="1859651" cy="194383"/>
+          </a:xfrm>
+          <a:prstGeom prst="roundRect">
+            <a:avLst/>
+          </a:prstGeom>
+          <a:solidFill>
+            <a:schemeClr val="bg2"/>
+          </a:solidFill>
+          <a:ln>
+            <a:solidFill>
+              <a:schemeClr val="bg1"/>
+            </a:solidFill>
+          </a:ln>
+        </p:spPr>
+        <p:style>
+          <a:lnRef idx="2">
+            <a:schemeClr val="accent6"/>
+          </a:lnRef>
+          <a:fillRef idx="1">
+            <a:schemeClr val="lt1"/>
+          </a:fillRef>
+          <a:effectRef idx="0">
+            <a:schemeClr val="accent6"/>
+          </a:effectRef>
+          <a:fontRef idx="minor">
+            <a:schemeClr val="dk1"/>
+          </a:fontRef>
+        </p:style>
+        <p:txBody>
+          <a:bodyPr rtlCol="0" anchor="ctr"/>
+          <a:lstStyle/>
+          <a:p>
+            <a:pPr algn="ctr"/>
+            <a:r>
+              <a:rPr lang="fr-FR" sz="1200" dirty="0"/>
+              <a:t>Type 2</a:t>
+            </a:r>
+            <a:endParaRPr lang="fr-BE" sz="1200" dirty="0"/>
+          </a:p>
+        </p:txBody>
+      </p:sp>
+      <p:sp>
+        <p:nvSpPr>
+          <p:cNvPr id="11" name="Rectangle : coins arrondis 10">
+            <a:extLst>
+              <a:ext uri="{FF2B5EF4-FFF2-40B4-BE49-F238E27FC236}">
+                <a16:creationId xmlns:a16="http://schemas.microsoft.com/office/drawing/2014/main" id="{872445A9-5714-B8C2-6D5C-853B90C901BE}"/>
+              </a:ext>
+            </a:extLst>
+          </p:cNvPr>
+          <p:cNvSpPr/>
+          <p:nvPr/>
+        </p:nvSpPr>
+        <p:spPr>
+          <a:xfrm>
+            <a:off x="7982064" y="1568546"/>
+            <a:ext cx="1859651" cy="194383"/>
+          </a:xfrm>
+          <a:prstGeom prst="roundRect">
+            <a:avLst/>
+          </a:prstGeom>
+          <a:solidFill>
+            <a:schemeClr val="bg2"/>
+          </a:solidFill>
+          <a:ln>
+            <a:solidFill>
+              <a:schemeClr val="bg1"/>
+            </a:solidFill>
+          </a:ln>
+        </p:spPr>
+        <p:style>
+          <a:lnRef idx="2">
+            <a:schemeClr val="accent6"/>
+          </a:lnRef>
+          <a:fillRef idx="1">
+            <a:schemeClr val="lt1"/>
+          </a:fillRef>
+          <a:effectRef idx="0">
+            <a:schemeClr val="accent6"/>
+          </a:effectRef>
+          <a:fontRef idx="minor">
+            <a:schemeClr val="dk1"/>
+          </a:fontRef>
+        </p:style>
+        <p:txBody>
+          <a:bodyPr rtlCol="0" anchor="ctr"/>
+          <a:lstStyle/>
+          <a:p>
+            <a:pPr algn="ctr"/>
+            <a:r>
+              <a:rPr lang="fr-FR" sz="1200" dirty="0"/>
+              <a:t>Type 4</a:t>
+            </a:r>
+            <a:endParaRPr lang="fr-BE" sz="1200" dirty="0"/>
+          </a:p>
+        </p:txBody>
+      </p:sp>
+      <p:sp>
+        <p:nvSpPr>
+          <p:cNvPr id="12" name="Rectangle : coins arrondis 11">
+            <a:extLst>
+              <a:ext uri="{FF2B5EF4-FFF2-40B4-BE49-F238E27FC236}">
+                <a16:creationId xmlns:a16="http://schemas.microsoft.com/office/drawing/2014/main" id="{00C193E2-9EE2-5C76-154D-C114C5015C71}"/>
+              </a:ext>
+            </a:extLst>
+          </p:cNvPr>
+          <p:cNvSpPr/>
+          <p:nvPr/>
+        </p:nvSpPr>
+        <p:spPr>
+          <a:xfrm>
+            <a:off x="10137710" y="1567932"/>
+            <a:ext cx="1859651" cy="194383"/>
+          </a:xfrm>
+          <a:prstGeom prst="roundRect">
+            <a:avLst/>
+          </a:prstGeom>
+          <a:solidFill>
+            <a:schemeClr val="bg2"/>
+          </a:solidFill>
+          <a:ln>
+            <a:solidFill>
+              <a:schemeClr val="bg1"/>
+            </a:solidFill>
+          </a:ln>
+        </p:spPr>
+        <p:style>
+          <a:lnRef idx="2">
+            <a:schemeClr val="accent6"/>
+          </a:lnRef>
+          <a:fillRef idx="1">
+            <a:schemeClr val="lt1"/>
+          </a:fillRef>
+          <a:effectRef idx="0">
+            <a:schemeClr val="accent6"/>
+          </a:effectRef>
+          <a:fontRef idx="minor">
+            <a:schemeClr val="dk1"/>
+          </a:fontRef>
+        </p:style>
+        <p:txBody>
+          <a:bodyPr rtlCol="0" anchor="ctr"/>
+          <a:lstStyle/>
+          <a:p>
+            <a:pPr algn="ctr"/>
+            <a:r>
+              <a:rPr lang="fr-FR" sz="1200" dirty="0"/>
+              <a:t>Type 5</a:t>
+            </a:r>
+            <a:endParaRPr lang="fr-BE" sz="1200" dirty="0"/>
+          </a:p>
+        </p:txBody>
+      </p:sp>
+    </p:spTree>
+    <p:extLst>
+      <p:ext uri="{BB962C8B-B14F-4D97-AF65-F5344CB8AC3E}">
+        <p14:creationId xmlns:p14="http://schemas.microsoft.com/office/powerpoint/2010/main" val="2445203798"/>
+      </p:ext>
+    </p:extLst>
+  </p:cSld>
+  <p:clrMapOvr>
+    <a:masterClrMapping/>
+  </p:clrMapOvr>
+</p:sld>
+</file>
+
+<file path=ppt/slides/slide2.xml><?xml version="1.0" encoding="utf-8"?>
+<p:sld xmlns:a="http://schemas.openxmlformats.org/drawingml/2006/main" xmlns:r="http://schemas.openxmlformats.org/officeDocument/2006/relationships" xmlns:p="http://schemas.openxmlformats.org/presentationml/2006/main">
+  <p:cSld>
+    <p:spTree>
+      <p:nvGrpSpPr>
+        <p:cNvPr id="1" name=""/>
+        <p:cNvGrpSpPr/>
+        <p:nvPr/>
+      </p:nvGrpSpPr>
+      <p:grpSpPr>
+        <a:xfrm>
+          <a:off x="0" y="0"/>
+          <a:ext cx="0" cy="0"/>
+          <a:chOff x="0" y="0"/>
+          <a:chExt cx="0" cy="0"/>
+        </a:xfrm>
+      </p:grpSpPr>
+      <p:sp>
+        <p:nvSpPr>
+          <p:cNvPr id="10" name="ZoneTexte 9"/>
+          <p:cNvSpPr txBox="1"/>
+          <p:nvPr/>
+        </p:nvSpPr>
+        <p:spPr>
+          <a:xfrm>
+            <a:off x="451679" y="3297739"/>
+            <a:ext cx="903331" cy="400110"/>
+          </a:xfrm>
+          <a:prstGeom prst="rect">
+            <a:avLst/>
+          </a:prstGeom>
+          <a:noFill/>
+        </p:spPr>
+        <p:txBody>
+          <a:bodyPr wrap="square" rtlCol="0">
+            <a:spAutoFit/>
+          </a:bodyPr>
+          <a:lstStyle/>
+          <a:p>
+            <a:pPr algn="ctr"/>
+            <a:r>
+              <a:rPr lang="fr-FR" sz="1000" b="1" dirty="0">
+                <a:solidFill>
+                  <a:srgbClr val="C00000"/>
+                </a:solidFill>
+              </a:rPr>
+              <a:t>Land use </a:t>
+            </a:r>
+          </a:p>
+          <a:p>
+            <a:pPr algn="ctr"/>
+            <a:r>
+              <a:rPr lang="fr-FR" sz="1000" b="1" dirty="0" err="1">
+                <a:solidFill>
+                  <a:srgbClr val="C00000"/>
+                </a:solidFill>
+              </a:rPr>
+              <a:t>displacement</a:t>
+            </a:r>
+            <a:endParaRPr lang="fr-FR" sz="1000" b="1" dirty="0">
+              <a:solidFill>
+                <a:srgbClr val="C00000"/>
+              </a:solidFill>
+            </a:endParaRPr>
+          </a:p>
+        </p:txBody>
+      </p:sp>
+      <p:sp>
+        <p:nvSpPr>
+          <p:cNvPr id="23" name="ZoneTexte 22"/>
+          <p:cNvSpPr txBox="1"/>
+          <p:nvPr/>
+        </p:nvSpPr>
+        <p:spPr>
+          <a:xfrm>
+            <a:off x="10924846" y="14518"/>
+            <a:ext cx="1338177" cy="307777"/>
+          </a:xfrm>
+          <a:prstGeom prst="rect">
+            <a:avLst/>
+          </a:prstGeom>
+          <a:noFill/>
+        </p:spPr>
+        <p:txBody>
+          <a:bodyPr wrap="square" rtlCol="0">
+            <a:spAutoFit/>
+          </a:bodyPr>
+          <a:lstStyle/>
+          <a:p>
+            <a:pPr algn="ctr"/>
+            <a:r>
+              <a:rPr lang="fr-FR" sz="1400" dirty="0">
+                <a:solidFill>
+                  <a:schemeClr val="tx2"/>
+                </a:solidFill>
+              </a:rPr>
+              <a:t>DEMAND SIDE</a:t>
+            </a:r>
+          </a:p>
+        </p:txBody>
+      </p:sp>
+      <p:sp>
+        <p:nvSpPr>
+          <p:cNvPr id="27" name="ZoneTexte 26"/>
+          <p:cNvSpPr txBox="1"/>
+          <p:nvPr/>
+        </p:nvSpPr>
+        <p:spPr>
+          <a:xfrm>
+            <a:off x="-237491" y="6530834"/>
+            <a:ext cx="1482208" cy="307777"/>
+          </a:xfrm>
+          <a:prstGeom prst="rect">
+            <a:avLst/>
+          </a:prstGeom>
+          <a:noFill/>
+        </p:spPr>
+        <p:txBody>
+          <a:bodyPr wrap="square" rtlCol="0">
+            <a:spAutoFit/>
+          </a:bodyPr>
+          <a:lstStyle/>
+          <a:p>
+            <a:pPr algn="ctr"/>
+            <a:r>
+              <a:rPr lang="fr-FR" sz="1400" dirty="0">
+                <a:solidFill>
+                  <a:schemeClr val="tx2"/>
+                </a:solidFill>
+              </a:rPr>
+              <a:t>SUPPLY SIDE</a:t>
+            </a:r>
+          </a:p>
+        </p:txBody>
+      </p:sp>
+      <p:sp>
+        <p:nvSpPr>
+          <p:cNvPr id="36" name="Rectangle 35"/>
+          <p:cNvSpPr/>
+          <p:nvPr/>
+        </p:nvSpPr>
+        <p:spPr>
+          <a:xfrm>
+            <a:off x="282041" y="30245"/>
+            <a:ext cx="2339861" cy="562252"/>
+          </a:xfrm>
+          <a:prstGeom prst="rect">
+            <a:avLst/>
+          </a:prstGeom>
+          <a:solidFill>
+            <a:schemeClr val="bg1"/>
+          </a:solidFill>
+          <a:ln>
+            <a:solidFill>
+              <a:schemeClr val="tx1"/>
+            </a:solidFill>
+          </a:ln>
+          <a:effectLst>
+            <a:outerShdw blurRad="50800" dist="38100" dir="2700000" algn="tl" rotWithShape="0">
+              <a:prstClr val="black">
+                <a:alpha val="40000"/>
+              </a:prstClr>
+            </a:outerShdw>
+          </a:effectLst>
+        </p:spPr>
+        <p:style>
+          <a:lnRef idx="2">
+            <a:schemeClr val="accent1">
+              <a:shade val="50000"/>
+            </a:schemeClr>
+          </a:lnRef>
+          <a:fillRef idx="1">
+            <a:schemeClr val="accent1"/>
+          </a:fillRef>
+          <a:effectRef idx="0">
+            <a:schemeClr val="accent1"/>
+          </a:effectRef>
+          <a:fontRef idx="minor">
+            <a:schemeClr val="lt1"/>
+          </a:fontRef>
+        </p:style>
+        <p:txBody>
+          <a:bodyPr rtlCol="0" anchor="ctr"/>
+          <a:lstStyle/>
+          <a:p>
+            <a:pPr algn="ctr"/>
+            <a:endParaRPr lang="fr-FR" dirty="0"/>
+          </a:p>
+        </p:txBody>
+      </p:sp>
+      <p:sp>
+        <p:nvSpPr>
+          <p:cNvPr id="37" name="ZoneTexte 36"/>
+          <p:cNvSpPr txBox="1"/>
+          <p:nvPr/>
+        </p:nvSpPr>
+        <p:spPr>
+          <a:xfrm>
+            <a:off x="282041" y="30244"/>
+            <a:ext cx="2434305" cy="584775"/>
+          </a:xfrm>
+          <a:prstGeom prst="rect">
+            <a:avLst/>
+          </a:prstGeom>
+          <a:noFill/>
+          <a:effectLst/>
+        </p:spPr>
+        <p:txBody>
+          <a:bodyPr wrap="square" rtlCol="0">
+            <a:spAutoFit/>
+          </a:bodyPr>
+          <a:lstStyle/>
+          <a:p>
+            <a:pPr algn="ctr"/>
+            <a:r>
+              <a:rPr lang="fr-FR" sz="1200" b="1" dirty="0"/>
+              <a:t>RFS mandates</a:t>
+            </a:r>
+            <a:endParaRPr lang="fr-FR" sz="1200" dirty="0"/>
+          </a:p>
+          <a:p>
+            <a:pPr algn="ctr"/>
+            <a:r>
+              <a:rPr lang="fr-FR" sz="1000" dirty="0"/>
+              <a:t>positive </a:t>
+            </a:r>
+            <a:r>
+              <a:rPr lang="fr-FR" sz="1000" dirty="0" err="1"/>
+              <a:t>demand</a:t>
+            </a:r>
+            <a:r>
+              <a:rPr lang="fr-FR" sz="1000" dirty="0"/>
+              <a:t> </a:t>
+            </a:r>
+            <a:r>
+              <a:rPr lang="fr-FR" sz="1000" dirty="0" err="1"/>
+              <a:t>shocks</a:t>
+            </a:r>
+            <a:r>
+              <a:rPr lang="fr-FR" sz="1000" dirty="0"/>
+              <a:t> on global </a:t>
+            </a:r>
+            <a:r>
+              <a:rPr lang="fr-FR" sz="1000" dirty="0" err="1"/>
+              <a:t>maize</a:t>
+            </a:r>
+            <a:r>
+              <a:rPr lang="fr-FR" sz="1000" dirty="0"/>
+              <a:t> </a:t>
+            </a:r>
+            <a:r>
+              <a:rPr lang="fr-FR" sz="1000" dirty="0" err="1"/>
+              <a:t>market</a:t>
+            </a:r>
+            <a:r>
+              <a:rPr lang="fr-FR" sz="1000" dirty="0"/>
+              <a:t>, for </a:t>
+            </a:r>
+            <a:r>
+              <a:rPr lang="fr-FR" sz="1000" dirty="0" err="1"/>
+              <a:t>ethanol</a:t>
+            </a:r>
+            <a:r>
+              <a:rPr lang="fr-FR" sz="1000" dirty="0"/>
+              <a:t> production</a:t>
+            </a:r>
+          </a:p>
+        </p:txBody>
+      </p:sp>
+      <p:sp>
+        <p:nvSpPr>
+          <p:cNvPr id="54" name="Accolade ouvrante 53"/>
+          <p:cNvSpPr/>
+          <p:nvPr/>
+        </p:nvSpPr>
+        <p:spPr>
+          <a:xfrm>
             <a:off x="339223" y="1581477"/>
             <a:ext cx="344246" cy="3940233"/>
           </a:xfrm>
@@ -4735,7 +6878,7 @@
     </p:spTree>
     <p:extLst>
       <p:ext uri="{BB962C8B-B14F-4D97-AF65-F5344CB8AC3E}">
-        <p14:creationId xmlns:p14="http://schemas.microsoft.com/office/powerpoint/2010/main" val="2445203798"/>
+        <p14:creationId xmlns:p14="http://schemas.microsoft.com/office/powerpoint/2010/main" val="874430838"/>
       </p:ext>
     </p:extLst>
   </p:cSld>

</xml_diff>

<commit_message>
new robustness check for no lead included in cumulative
</commit_message>
<xml_diff>
--- a/embedded_COEFFS_substitutability_maize_quadrant_full_5.0.pptx
+++ b/embedded_COEFFS_substitutability_maize_quadrant_full_5.0.pptx
@@ -242,7 +242,7 @@
           <a:p>
             <a:fld id="{B4F1BE71-D697-4FA9-9464-5030FED053B9}" type="datetimeFigureOut">
               <a:rPr lang="fr-FR" smtClean="0"/>
-              <a:t>15/10/2024</a:t>
+              <a:t>23/10/2024</a:t>
             </a:fld>
             <a:endParaRPr lang="fr-FR"/>
           </a:p>
@@ -410,7 +410,7 @@
           <a:p>
             <a:fld id="{B4F1BE71-D697-4FA9-9464-5030FED053B9}" type="datetimeFigureOut">
               <a:rPr lang="fr-FR" smtClean="0"/>
-              <a:t>15/10/2024</a:t>
+              <a:t>23/10/2024</a:t>
             </a:fld>
             <a:endParaRPr lang="fr-FR"/>
           </a:p>
@@ -588,7 +588,7 @@
           <a:p>
             <a:fld id="{B4F1BE71-D697-4FA9-9464-5030FED053B9}" type="datetimeFigureOut">
               <a:rPr lang="fr-FR" smtClean="0"/>
-              <a:t>15/10/2024</a:t>
+              <a:t>23/10/2024</a:t>
             </a:fld>
             <a:endParaRPr lang="fr-FR"/>
           </a:p>
@@ -756,7 +756,7 @@
           <a:p>
             <a:fld id="{B4F1BE71-D697-4FA9-9464-5030FED053B9}" type="datetimeFigureOut">
               <a:rPr lang="fr-FR" smtClean="0"/>
-              <a:t>15/10/2024</a:t>
+              <a:t>23/10/2024</a:t>
             </a:fld>
             <a:endParaRPr lang="fr-FR"/>
           </a:p>
@@ -1001,7 +1001,7 @@
           <a:p>
             <a:fld id="{B4F1BE71-D697-4FA9-9464-5030FED053B9}" type="datetimeFigureOut">
               <a:rPr lang="fr-FR" smtClean="0"/>
-              <a:t>15/10/2024</a:t>
+              <a:t>23/10/2024</a:t>
             </a:fld>
             <a:endParaRPr lang="fr-FR"/>
           </a:p>
@@ -1230,7 +1230,7 @@
           <a:p>
             <a:fld id="{B4F1BE71-D697-4FA9-9464-5030FED053B9}" type="datetimeFigureOut">
               <a:rPr lang="fr-FR" smtClean="0"/>
-              <a:t>15/10/2024</a:t>
+              <a:t>23/10/2024</a:t>
             </a:fld>
             <a:endParaRPr lang="fr-FR"/>
           </a:p>
@@ -1594,7 +1594,7 @@
           <a:p>
             <a:fld id="{B4F1BE71-D697-4FA9-9464-5030FED053B9}" type="datetimeFigureOut">
               <a:rPr lang="fr-FR" smtClean="0"/>
-              <a:t>15/10/2024</a:t>
+              <a:t>23/10/2024</a:t>
             </a:fld>
             <a:endParaRPr lang="fr-FR"/>
           </a:p>
@@ -1711,7 +1711,7 @@
           <a:p>
             <a:fld id="{B4F1BE71-D697-4FA9-9464-5030FED053B9}" type="datetimeFigureOut">
               <a:rPr lang="fr-FR" smtClean="0"/>
-              <a:t>15/10/2024</a:t>
+              <a:t>23/10/2024</a:t>
             </a:fld>
             <a:endParaRPr lang="fr-FR"/>
           </a:p>
@@ -1806,7 +1806,7 @@
           <a:p>
             <a:fld id="{B4F1BE71-D697-4FA9-9464-5030FED053B9}" type="datetimeFigureOut">
               <a:rPr lang="fr-FR" smtClean="0"/>
-              <a:t>15/10/2024</a:t>
+              <a:t>23/10/2024</a:t>
             </a:fld>
             <a:endParaRPr lang="fr-FR"/>
           </a:p>
@@ -2081,7 +2081,7 @@
           <a:p>
             <a:fld id="{B4F1BE71-D697-4FA9-9464-5030FED053B9}" type="datetimeFigureOut">
               <a:rPr lang="fr-FR" smtClean="0"/>
-              <a:t>15/10/2024</a:t>
+              <a:t>23/10/2024</a:t>
             </a:fld>
             <a:endParaRPr lang="fr-FR"/>
           </a:p>
@@ -2333,7 +2333,7 @@
           <a:p>
             <a:fld id="{B4F1BE71-D697-4FA9-9464-5030FED053B9}" type="datetimeFigureOut">
               <a:rPr lang="fr-FR" smtClean="0"/>
-              <a:t>15/10/2024</a:t>
+              <a:t>23/10/2024</a:t>
             </a:fld>
             <a:endParaRPr lang="fr-FR"/>
           </a:p>
@@ -2544,7 +2544,7 @@
           <a:p>
             <a:fld id="{B4F1BE71-D697-4FA9-9464-5030FED053B9}" type="datetimeFigureOut">
               <a:rPr lang="fr-FR" smtClean="0"/>
-              <a:t>15/10/2024</a:t>
+              <a:t>23/10/2024</a:t>
             </a:fld>
             <a:endParaRPr lang="fr-FR"/>
           </a:p>
@@ -2965,8 +2965,8 @@
         </p:nvSpPr>
         <p:spPr>
           <a:xfrm>
-            <a:off x="451679" y="3297739"/>
-            <a:ext cx="903331" cy="400110"/>
+            <a:off x="390490" y="2916323"/>
+            <a:ext cx="989540" cy="430887"/>
           </a:xfrm>
           <a:prstGeom prst="rect">
             <a:avLst/>
@@ -2981,7 +2981,7 @@
           <a:p>
             <a:pPr algn="ctr"/>
             <a:r>
-              <a:rPr lang="fr-FR" sz="1000" b="1" dirty="0">
+              <a:rPr lang="fr-FR" sz="1050" b="1" dirty="0">
                 <a:solidFill>
                   <a:srgbClr val="C00000"/>
                 </a:solidFill>
@@ -2992,14 +2992,14 @@
           <a:p>
             <a:pPr algn="ctr"/>
             <a:r>
-              <a:rPr lang="fr-FR" sz="1000" b="1" dirty="0" err="1">
+              <a:rPr lang="fr-FR" sz="1050" b="1" dirty="0" err="1">
                 <a:solidFill>
                   <a:srgbClr val="C00000"/>
                 </a:solidFill>
               </a:rPr>
               <a:t>displacement</a:t>
             </a:r>
-            <a:endParaRPr lang="fr-FR" sz="1000" b="1" dirty="0">
+            <a:endParaRPr lang="fr-FR" sz="1050" b="1" dirty="0">
               <a:solidFill>
                 <a:srgbClr val="C00000"/>
               </a:solidFill>
@@ -3217,8 +3217,8 @@
         </p:nvSpPr>
         <p:spPr>
           <a:xfrm>
-            <a:off x="339223" y="1581476"/>
-            <a:ext cx="344246" cy="4250157"/>
+            <a:off x="339223" y="1760164"/>
+            <a:ext cx="344246" cy="2914187"/>
           </a:xfrm>
           <a:prstGeom prst="leftBrace">
             <a:avLst>
@@ -3263,8 +3263,8 @@
         </p:nvSpPr>
         <p:spPr>
           <a:xfrm>
-            <a:off x="1186419" y="3842738"/>
-            <a:ext cx="817922" cy="1169551"/>
+            <a:off x="1186419" y="4159985"/>
+            <a:ext cx="817922" cy="415498"/>
           </a:xfrm>
           <a:prstGeom prst="rect">
             <a:avLst/>
@@ -3279,7 +3279,7 @@
           <a:p>
             <a:pPr algn="ctr"/>
             <a:r>
-              <a:rPr lang="fr-FR" sz="1000" b="1" i="1" dirty="0" err="1">
+              <a:rPr lang="fr-FR" sz="1050" b="1" i="1" dirty="0" err="1">
                 <a:solidFill>
                   <a:srgbClr val="0070C0"/>
                 </a:solidFill>
@@ -3287,106 +3287,13 @@
               <a:t>Crowding</a:t>
             </a:r>
             <a:r>
-              <a:rPr lang="fr-FR" sz="1000" b="1" i="1" dirty="0">
+              <a:rPr lang="fr-FR" sz="1050" b="1" i="1" dirty="0">
                 <a:solidFill>
                   <a:srgbClr val="0070C0"/>
                 </a:solidFill>
               </a:rPr>
               <a:t> out</a:t>
             </a:r>
-          </a:p>
-          <a:p>
-            <a:pPr algn="ctr"/>
-            <a:r>
-              <a:rPr lang="fr-FR" sz="1000" b="1" i="1" dirty="0">
-                <a:solidFill>
-                  <a:srgbClr val="0070C0"/>
-                </a:solidFill>
-              </a:rPr>
-              <a:t>(non-land input</a:t>
-            </a:r>
-          </a:p>
-          <a:p>
-            <a:pPr algn="ctr"/>
-            <a:r>
-              <a:rPr lang="fr-FR" sz="1000" b="1" i="1" dirty="0" err="1">
-                <a:solidFill>
-                  <a:srgbClr val="0070C0"/>
-                </a:solidFill>
-              </a:rPr>
-              <a:t>constraint</a:t>
-            </a:r>
-            <a:r>
-              <a:rPr lang="fr-FR" sz="1000" b="1" i="1" dirty="0">
-                <a:solidFill>
-                  <a:srgbClr val="0070C0"/>
-                </a:solidFill>
-              </a:rPr>
-              <a:t>)</a:t>
-            </a:r>
-            <a:endParaRPr lang="fr-FR" sz="1000" b="1" dirty="0">
-              <a:solidFill>
-                <a:schemeClr val="accent1"/>
-              </a:solidFill>
-            </a:endParaRPr>
-          </a:p>
-          <a:p>
-            <a:pPr algn="ctr"/>
-            <a:endParaRPr lang="fr-FR" sz="1000" b="1" dirty="0">
-              <a:solidFill>
-                <a:schemeClr val="accent1"/>
-              </a:solidFill>
-            </a:endParaRPr>
-          </a:p>
-          <a:p>
-            <a:pPr algn="ctr"/>
-            <a:endParaRPr lang="fr-FR" sz="1000" dirty="0"/>
-          </a:p>
-        </p:txBody>
-      </p:sp>
-      <p:sp>
-        <p:nvSpPr>
-          <p:cNvPr id="31" name="Accolade ouvrante 30"/>
-          <p:cNvSpPr/>
-          <p:nvPr/>
-        </p:nvSpPr>
-        <p:spPr>
-          <a:xfrm>
-            <a:off x="1099963" y="1581478"/>
-            <a:ext cx="344246" cy="5246277"/>
-          </a:xfrm>
-          <a:prstGeom prst="leftBrace">
-            <a:avLst>
-              <a:gd name="adj1" fmla="val 23958"/>
-              <a:gd name="adj2" fmla="val 50254"/>
-            </a:avLst>
-          </a:prstGeom>
-          <a:ln>
-            <a:solidFill>
-              <a:schemeClr val="tx1"/>
-            </a:solidFill>
-          </a:ln>
-        </p:spPr>
-        <p:style>
-          <a:lnRef idx="1">
-            <a:schemeClr val="accent1"/>
-          </a:lnRef>
-          <a:fillRef idx="0">
-            <a:schemeClr val="accent1"/>
-          </a:fillRef>
-          <a:effectRef idx="0">
-            <a:schemeClr val="accent1"/>
-          </a:effectRef>
-          <a:fontRef idx="minor">
-            <a:schemeClr val="tx1"/>
-          </a:fontRef>
-        </p:style>
-        <p:txBody>
-          <a:bodyPr rtlCol="0" anchor="ctr"/>
-          <a:lstStyle/>
-          <a:p>
-            <a:pPr algn="ctr"/>
-            <a:endParaRPr lang="fr-FR"/>
           </a:p>
         </p:txBody>
       </p:sp>
@@ -3402,8 +3309,8 @@
         </p:nvCxnSpPr>
         <p:spPr>
           <a:xfrm rot="10800000" flipH="1" flipV="1">
-            <a:off x="282041" y="322631"/>
-            <a:ext cx="57182" cy="3383923"/>
+            <a:off x="282041" y="322632"/>
+            <a:ext cx="57182" cy="2894626"/>
           </a:xfrm>
           <a:prstGeom prst="curvedConnector3">
             <a:avLst>
@@ -3438,14 +3345,13 @@
           <p:cNvCxnSpPr>
             <a:cxnSpLocks/>
             <a:stCxn id="37" idx="1"/>
-            <a:endCxn id="31" idx="1"/>
           </p:cNvCxnSpPr>
           <p:nvPr/>
         </p:nvCxnSpPr>
         <p:spPr>
           <a:xfrm rot="10800000" flipH="1" flipV="1">
-            <a:off x="282041" y="322632"/>
-            <a:ext cx="817922" cy="3895310"/>
+            <a:off x="282041" y="322631"/>
+            <a:ext cx="817922" cy="3984199"/>
           </a:xfrm>
           <a:prstGeom prst="curvedConnector3">
             <a:avLst>
@@ -3485,8 +3391,8 @@
         </p:nvSpPr>
         <p:spPr>
           <a:xfrm rot="5400000">
-            <a:off x="4800457" y="-2611656"/>
-            <a:ext cx="299791" cy="6523024"/>
+            <a:off x="4537560" y="-2348758"/>
+            <a:ext cx="299791" cy="5997230"/>
           </a:xfrm>
           <a:prstGeom prst="leftBrace">
             <a:avLst>
@@ -3532,7 +3438,7 @@
         <p:spPr>
           <a:xfrm>
             <a:off x="3483928" y="1319867"/>
-            <a:ext cx="8708072" cy="253916"/>
+            <a:ext cx="8537934" cy="261610"/>
           </a:xfrm>
           <a:prstGeom prst="rect">
             <a:avLst/>
@@ -3552,7 +3458,7 @@
                   <a:srgbClr val="0070C0"/>
                 </a:solidFill>
               </a:rPr>
-              <a:t>Revenue </a:t>
+              <a:t>Budget </a:t>
             </a:r>
             <a:r>
               <a:rPr lang="fr-FR" sz="1050" b="1" i="1" dirty="0" err="1">
@@ -3574,8 +3480,8 @@
         </p:nvSpPr>
         <p:spPr>
           <a:xfrm rot="5400000">
-            <a:off x="6769538" y="-3945559"/>
-            <a:ext cx="341766" cy="10503160"/>
+            <a:off x="6672218" y="-3848239"/>
+            <a:ext cx="341766" cy="10308520"/>
           </a:xfrm>
           <a:prstGeom prst="leftBrace">
             <a:avLst>
@@ -3625,12 +3531,12 @@
         <p:spPr>
           <a:xfrm>
             <a:off x="2621902" y="311371"/>
-            <a:ext cx="8519678" cy="823767"/>
+            <a:ext cx="8344504" cy="823767"/>
           </a:xfrm>
           <a:prstGeom prst="curvedConnector4">
             <a:avLst>
-              <a:gd name="adj1" fmla="val 24342"/>
-              <a:gd name="adj2" fmla="val 1436"/>
+              <a:gd name="adj1" fmla="val 24269"/>
+              <a:gd name="adj2" fmla="val 3056"/>
             </a:avLst>
           </a:prstGeom>
           <a:ln w="9525" cap="flat" cmpd="dbl" algn="ctr">
@@ -3671,12 +3577,12 @@
         <p:spPr>
           <a:xfrm>
             <a:off x="2621902" y="311371"/>
-            <a:ext cx="2328451" cy="188589"/>
+            <a:ext cx="2065554" cy="188591"/>
           </a:xfrm>
           <a:prstGeom prst="curvedConnector4">
             <a:avLst>
-              <a:gd name="adj1" fmla="val 46781"/>
-              <a:gd name="adj2" fmla="val -3824"/>
+              <a:gd name="adj1" fmla="val 46372"/>
+              <a:gd name="adj2" fmla="val -2953"/>
             </a:avLst>
           </a:prstGeom>
           <a:ln>
@@ -3710,7 +3616,7 @@
         <p:spPr>
           <a:xfrm>
             <a:off x="1717194" y="648507"/>
-            <a:ext cx="6517468" cy="384721"/>
+            <a:ext cx="5968875" cy="407804"/>
           </a:xfrm>
           <a:prstGeom prst="rect">
             <a:avLst/>
@@ -3725,7 +3631,7 @@
           <a:p>
             <a:pPr algn="ctr"/>
             <a:r>
-              <a:rPr lang="fr-FR" sz="1000" b="1" dirty="0" err="1">
+              <a:rPr lang="fr-FR" sz="1050" b="1" dirty="0" err="1">
                 <a:solidFill>
                   <a:srgbClr val="C00000"/>
                 </a:solidFill>
@@ -3733,7 +3639,23 @@
               <a:t>Feed</a:t>
             </a:r>
             <a:r>
-              <a:rPr lang="fr-FR" sz="1000" b="1" dirty="0">
+              <a:rPr lang="fr-FR" sz="1050" b="1" dirty="0">
+                <a:solidFill>
+                  <a:srgbClr val="C00000"/>
+                </a:solidFill>
+              </a:rPr>
+              <a:t> or </a:t>
+            </a:r>
+            <a:r>
+              <a:rPr lang="fr-FR" sz="1050" b="1" dirty="0" err="1">
+                <a:solidFill>
+                  <a:srgbClr val="C00000"/>
+                </a:solidFill>
+              </a:rPr>
+              <a:t>staple</a:t>
+            </a:r>
+            <a:r>
+              <a:rPr lang="fr-FR" sz="1050" b="1" dirty="0">
                 <a:solidFill>
                   <a:srgbClr val="C00000"/>
                 </a:solidFill>
@@ -3741,7 +3663,7 @@
               <a:t> </a:t>
             </a:r>
             <a:r>
-              <a:rPr lang="fr-FR" sz="1000" b="1" dirty="0" err="1">
+              <a:rPr lang="fr-FR" sz="1050" b="1" dirty="0" err="1">
                 <a:solidFill>
                   <a:srgbClr val="C00000"/>
                 </a:solidFill>
@@ -3749,7 +3671,7 @@
               <a:t>crops</a:t>
             </a:r>
             <a:r>
-              <a:rPr lang="fr-FR" sz="1000" b="1" dirty="0">
+              <a:rPr lang="fr-FR" sz="1050" b="1" dirty="0">
                 <a:solidFill>
                   <a:srgbClr val="C00000"/>
                 </a:solidFill>
@@ -3760,15 +3682,15 @@
           <a:p>
             <a:pPr algn="ctr"/>
             <a:r>
-              <a:rPr lang="fr-FR" sz="900" dirty="0" err="1"/>
+              <a:rPr lang="fr-FR" sz="1000" dirty="0" err="1"/>
               <a:t>attenuated</a:t>
             </a:r>
             <a:r>
-              <a:rPr lang="fr-FR" sz="900" dirty="0"/>
+              <a:rPr lang="fr-FR" sz="1000" dirty="0"/>
               <a:t> by DDGS </a:t>
             </a:r>
             <a:r>
-              <a:rPr lang="fr-FR" sz="900" dirty="0" err="1"/>
+              <a:rPr lang="fr-FR" sz="1000" dirty="0" err="1"/>
               <a:t>supply</a:t>
             </a:r>
             <a:endParaRPr lang="fr-FR" sz="900" dirty="0"/>
@@ -3830,7 +3752,7 @@
         <p:spPr>
           <a:xfrm>
             <a:off x="3778897" y="1033404"/>
-            <a:ext cx="6134022" cy="246221"/>
+            <a:ext cx="6134022" cy="253916"/>
           </a:xfrm>
           <a:prstGeom prst="rect">
             <a:avLst/>
@@ -3845,7 +3767,7 @@
           <a:p>
             <a:pPr algn="ctr"/>
             <a:r>
-              <a:rPr lang="fr-FR" sz="1000" b="1" i="1" dirty="0" err="1">
+              <a:rPr lang="fr-FR" sz="1050" b="1" i="1" dirty="0" err="1">
                 <a:solidFill>
                   <a:srgbClr val="0070C0"/>
                 </a:solidFill>
@@ -3853,7 +3775,7 @@
               <a:t>Biofuel</a:t>
             </a:r>
             <a:r>
-              <a:rPr lang="fr-FR" sz="1000" b="1" i="1" dirty="0">
+              <a:rPr lang="fr-FR" sz="1050" b="1" i="1" dirty="0">
                 <a:solidFill>
                   <a:srgbClr val="0070C0"/>
                 </a:solidFill>
@@ -3861,7 +3783,7 @@
               <a:t> </a:t>
             </a:r>
             <a:r>
-              <a:rPr lang="fr-FR" sz="1000" b="1" i="1" dirty="0" err="1">
+              <a:rPr lang="fr-FR" sz="1050" b="1" i="1" dirty="0" err="1">
                 <a:solidFill>
                   <a:srgbClr val="0070C0"/>
                 </a:solidFill>
@@ -3869,7 +3791,7 @@
               <a:t>feedstocks</a:t>
             </a:r>
             <a:r>
-              <a:rPr lang="fr-FR" sz="1000" b="1" i="1" dirty="0">
+              <a:rPr lang="fr-FR" sz="1050" b="1" i="1" dirty="0">
                 <a:solidFill>
                   <a:srgbClr val="0070C0"/>
                 </a:solidFill>
@@ -3925,12 +3847,918 @@
           </a:fontRef>
         </p:style>
       </p:cxnSp>
+      <p:pic>
+        <p:nvPicPr>
+          <p:cNvPr id="51" name="Image 50" descr="Une image contenant texte, capture d’écran, diagramme, Tracé&#10;&#10;Description générée automatiquement">
+            <a:extLst>
+              <a:ext uri="{FF2B5EF4-FFF2-40B4-BE49-F238E27FC236}">
+                <a16:creationId xmlns:a16="http://schemas.microsoft.com/office/drawing/2014/main" id="{5CAB7067-76B2-3FA0-0403-EA2CF79EA34B}"/>
+              </a:ext>
+            </a:extLst>
+          </p:cNvPr>
+          <p:cNvPicPr>
+            <a:picLocks noChangeAspect="1"/>
+          </p:cNvPicPr>
+          <p:nvPr/>
+        </p:nvPicPr>
+        <p:blipFill>
+          <a:blip r:embed="rId2" cstate="print">
+            <a:extLst>
+              <a:ext uri="{28A0092B-C50C-407E-A947-70E740481C1C}">
+                <a14:useLocalDpi xmlns:a14="http://schemas.microsoft.com/office/drawing/2010/main" val="0"/>
+              </a:ext>
+            </a:extLst>
+          </a:blip>
+          <a:stretch>
+            <a:fillRect/>
+          </a:stretch>
+        </p:blipFill>
+        <p:spPr>
+          <a:xfrm>
+            <a:off x="9797928" y="1752370"/>
+            <a:ext cx="2286005" cy="1371603"/>
+          </a:xfrm>
+          <a:prstGeom prst="rect">
+            <a:avLst/>
+          </a:prstGeom>
+        </p:spPr>
+      </p:pic>
+      <p:pic>
+        <p:nvPicPr>
+          <p:cNvPr id="55" name="Image 54" descr="Une image contenant texte, ligne, diagramme, capture d’écran&#10;&#10;Description générée automatiquement">
+            <a:extLst>
+              <a:ext uri="{FF2B5EF4-FFF2-40B4-BE49-F238E27FC236}">
+                <a16:creationId xmlns:a16="http://schemas.microsoft.com/office/drawing/2014/main" id="{DA187E9F-21E7-456E-CB3C-73F98199493F}"/>
+              </a:ext>
+            </a:extLst>
+          </p:cNvPr>
+          <p:cNvPicPr>
+            <a:picLocks noChangeAspect="1"/>
+          </p:cNvPicPr>
+          <p:nvPr/>
+        </p:nvPicPr>
+        <p:blipFill>
+          <a:blip r:embed="rId3" cstate="print">
+            <a:extLst>
+              <a:ext uri="{28A0092B-C50C-407E-A947-70E740481C1C}">
+                <a14:useLocalDpi xmlns:a14="http://schemas.microsoft.com/office/drawing/2010/main" val="0"/>
+              </a:ext>
+            </a:extLst>
+          </a:blip>
+          <a:stretch>
+            <a:fillRect/>
+          </a:stretch>
+        </p:blipFill>
+        <p:spPr>
+          <a:xfrm>
+            <a:off x="7653276" y="1752990"/>
+            <a:ext cx="2286005" cy="1371603"/>
+          </a:xfrm>
+          <a:prstGeom prst="rect">
+            <a:avLst/>
+          </a:prstGeom>
+        </p:spPr>
+      </p:pic>
+      <p:pic>
+        <p:nvPicPr>
+          <p:cNvPr id="58" name="Image 57" descr="Une image contenant texte, capture d’écran, ligne, diagramme&#10;&#10;Description générée automatiquement">
+            <a:extLst>
+              <a:ext uri="{FF2B5EF4-FFF2-40B4-BE49-F238E27FC236}">
+                <a16:creationId xmlns:a16="http://schemas.microsoft.com/office/drawing/2014/main" id="{0254ABF5-CB8F-5934-2D5E-33788432AE30}"/>
+              </a:ext>
+            </a:extLst>
+          </p:cNvPr>
+          <p:cNvPicPr>
+            <a:picLocks noChangeAspect="1"/>
+          </p:cNvPicPr>
+          <p:nvPr/>
+        </p:nvPicPr>
+        <p:blipFill>
+          <a:blip r:embed="rId4" cstate="print">
+            <a:extLst>
+              <a:ext uri="{28A0092B-C50C-407E-A947-70E740481C1C}">
+                <a14:useLocalDpi xmlns:a14="http://schemas.microsoft.com/office/drawing/2010/main" val="0"/>
+              </a:ext>
+            </a:extLst>
+          </a:blip>
+          <a:stretch>
+            <a:fillRect/>
+          </a:stretch>
+        </p:blipFill>
+        <p:spPr>
+          <a:xfrm>
+            <a:off x="7740303" y="4674351"/>
+            <a:ext cx="2286005" cy="1371603"/>
+          </a:xfrm>
+          <a:prstGeom prst="rect">
+            <a:avLst/>
+          </a:prstGeom>
+        </p:spPr>
+      </p:pic>
+      <p:pic>
+        <p:nvPicPr>
+          <p:cNvPr id="71" name="Image 70" descr="Une image contenant texte, diagramme, ligne, capture d’écran&#10;&#10;Description générée automatiquement">
+            <a:extLst>
+              <a:ext uri="{FF2B5EF4-FFF2-40B4-BE49-F238E27FC236}">
+                <a16:creationId xmlns:a16="http://schemas.microsoft.com/office/drawing/2014/main" id="{6CD2EA21-D9B0-FE97-543E-FF45B2945333}"/>
+              </a:ext>
+            </a:extLst>
+          </p:cNvPr>
+          <p:cNvPicPr>
+            <a:picLocks noChangeAspect="1"/>
+          </p:cNvPicPr>
+          <p:nvPr/>
+        </p:nvPicPr>
+        <p:blipFill>
+          <a:blip r:embed="rId5" cstate="print">
+            <a:extLst>
+              <a:ext uri="{28A0092B-C50C-407E-A947-70E740481C1C}">
+                <a14:useLocalDpi xmlns:a14="http://schemas.microsoft.com/office/drawing/2010/main" val="0"/>
+              </a:ext>
+            </a:extLst>
+          </a:blip>
+          <a:stretch>
+            <a:fillRect/>
+          </a:stretch>
+        </p:blipFill>
+        <p:spPr>
+          <a:xfrm>
+            <a:off x="9801711" y="5685463"/>
+            <a:ext cx="2286005" cy="1371603"/>
+          </a:xfrm>
+          <a:prstGeom prst="rect">
+            <a:avLst/>
+          </a:prstGeom>
+        </p:spPr>
+      </p:pic>
+      <p:sp>
+        <p:nvSpPr>
+          <p:cNvPr id="76" name="Rectangle : coins arrondis 75">
+            <a:extLst>
+              <a:ext uri="{FF2B5EF4-FFF2-40B4-BE49-F238E27FC236}">
+                <a16:creationId xmlns:a16="http://schemas.microsoft.com/office/drawing/2014/main" id="{0D70D76B-8077-18F5-FA1B-C4852E00F52F}"/>
+              </a:ext>
+            </a:extLst>
+          </p:cNvPr>
+          <p:cNvSpPr/>
+          <p:nvPr/>
+        </p:nvSpPr>
+        <p:spPr>
+          <a:xfrm>
+            <a:off x="8082926" y="4480772"/>
+            <a:ext cx="1859651" cy="194383"/>
+          </a:xfrm>
+          <a:prstGeom prst="roundRect">
+            <a:avLst/>
+          </a:prstGeom>
+          <a:solidFill>
+            <a:schemeClr val="bg2"/>
+          </a:solidFill>
+          <a:ln>
+            <a:solidFill>
+              <a:schemeClr val="bg1"/>
+            </a:solidFill>
+          </a:ln>
+        </p:spPr>
+        <p:style>
+          <a:lnRef idx="2">
+            <a:schemeClr val="accent6"/>
+          </a:lnRef>
+          <a:fillRef idx="1">
+            <a:schemeClr val="lt1"/>
+          </a:fillRef>
+          <a:effectRef idx="0">
+            <a:schemeClr val="accent6"/>
+          </a:effectRef>
+          <a:fontRef idx="minor">
+            <a:schemeClr val="dk1"/>
+          </a:fontRef>
+        </p:style>
+        <p:txBody>
+          <a:bodyPr rtlCol="0" anchor="ctr"/>
+          <a:lstStyle/>
+          <a:p>
+            <a:pPr algn="ctr"/>
+            <a:r>
+              <a:rPr lang="fr-FR" sz="1200" dirty="0"/>
+              <a:t>Type 5</a:t>
+            </a:r>
+            <a:endParaRPr lang="fr-BE" sz="1200" dirty="0"/>
+          </a:p>
+        </p:txBody>
+      </p:sp>
+      <p:sp>
+        <p:nvSpPr>
+          <p:cNvPr id="77" name="Rectangle : coins arrondis 76">
+            <a:extLst>
+              <a:ext uri="{FF2B5EF4-FFF2-40B4-BE49-F238E27FC236}">
+                <a16:creationId xmlns:a16="http://schemas.microsoft.com/office/drawing/2014/main" id="{E469FF62-D374-886F-7F13-D89020C84F31}"/>
+              </a:ext>
+            </a:extLst>
+          </p:cNvPr>
+          <p:cNvSpPr/>
+          <p:nvPr/>
+        </p:nvSpPr>
+        <p:spPr>
+          <a:xfrm>
+            <a:off x="10162211" y="5480447"/>
+            <a:ext cx="1859651" cy="194383"/>
+          </a:xfrm>
+          <a:prstGeom prst="roundRect">
+            <a:avLst/>
+          </a:prstGeom>
+          <a:solidFill>
+            <a:schemeClr val="bg2"/>
+          </a:solidFill>
+          <a:ln>
+            <a:solidFill>
+              <a:schemeClr val="bg1"/>
+            </a:solidFill>
+          </a:ln>
+        </p:spPr>
+        <p:style>
+          <a:lnRef idx="2">
+            <a:schemeClr val="accent6"/>
+          </a:lnRef>
+          <a:fillRef idx="1">
+            <a:schemeClr val="lt1"/>
+          </a:fillRef>
+          <a:effectRef idx="0">
+            <a:schemeClr val="accent6"/>
+          </a:effectRef>
+          <a:fontRef idx="minor">
+            <a:schemeClr val="dk1"/>
+          </a:fontRef>
+        </p:style>
+        <p:txBody>
+          <a:bodyPr rtlCol="0" anchor="ctr"/>
+          <a:lstStyle/>
+          <a:p>
+            <a:pPr algn="ctr"/>
+            <a:r>
+              <a:rPr lang="fr-FR" sz="1200" dirty="0"/>
+              <a:t>Type 6</a:t>
+            </a:r>
+            <a:endParaRPr lang="fr-BE" sz="1200" dirty="0"/>
+          </a:p>
+        </p:txBody>
+      </p:sp>
+      <p:sp>
+        <p:nvSpPr>
+          <p:cNvPr id="7" name="Rectangle : coins arrondis 6">
+            <a:extLst>
+              <a:ext uri="{FF2B5EF4-FFF2-40B4-BE49-F238E27FC236}">
+                <a16:creationId xmlns:a16="http://schemas.microsoft.com/office/drawing/2014/main" id="{E01C0012-5748-F2ED-8F5C-31BE0255D80D}"/>
+              </a:ext>
+            </a:extLst>
+          </p:cNvPr>
+          <p:cNvSpPr/>
+          <p:nvPr/>
+        </p:nvSpPr>
+        <p:spPr>
+          <a:xfrm>
+            <a:off x="3772129" y="1565781"/>
+            <a:ext cx="1859651" cy="194383"/>
+          </a:xfrm>
+          <a:prstGeom prst="roundRect">
+            <a:avLst/>
+          </a:prstGeom>
+          <a:solidFill>
+            <a:schemeClr val="bg2"/>
+          </a:solidFill>
+          <a:ln>
+            <a:solidFill>
+              <a:schemeClr val="bg1"/>
+            </a:solidFill>
+          </a:ln>
+        </p:spPr>
+        <p:style>
+          <a:lnRef idx="2">
+            <a:schemeClr val="accent6"/>
+          </a:lnRef>
+          <a:fillRef idx="1">
+            <a:schemeClr val="lt1"/>
+          </a:fillRef>
+          <a:effectRef idx="0">
+            <a:schemeClr val="accent6"/>
+          </a:effectRef>
+          <a:fontRef idx="minor">
+            <a:schemeClr val="dk1"/>
+          </a:fontRef>
+        </p:style>
+        <p:txBody>
+          <a:bodyPr rtlCol="0" anchor="ctr"/>
+          <a:lstStyle/>
+          <a:p>
+            <a:pPr algn="ctr"/>
+            <a:r>
+              <a:rPr lang="fr-FR" sz="1200" dirty="0"/>
+              <a:t>Type 1a</a:t>
+            </a:r>
+            <a:endParaRPr lang="fr-BE" sz="1200" dirty="0"/>
+          </a:p>
+        </p:txBody>
+      </p:sp>
+      <p:sp>
+        <p:nvSpPr>
+          <p:cNvPr id="9" name="Rectangle : coins arrondis 8">
+            <a:extLst>
+              <a:ext uri="{FF2B5EF4-FFF2-40B4-BE49-F238E27FC236}">
+                <a16:creationId xmlns:a16="http://schemas.microsoft.com/office/drawing/2014/main" id="{C3A94DB5-4C30-00F2-5412-446178F8CB5B}"/>
+              </a:ext>
+            </a:extLst>
+          </p:cNvPr>
+          <p:cNvSpPr/>
+          <p:nvPr/>
+        </p:nvSpPr>
+        <p:spPr>
+          <a:xfrm>
+            <a:off x="5852296" y="1569367"/>
+            <a:ext cx="1859651" cy="194383"/>
+          </a:xfrm>
+          <a:prstGeom prst="roundRect">
+            <a:avLst/>
+          </a:prstGeom>
+          <a:solidFill>
+            <a:schemeClr val="bg2"/>
+          </a:solidFill>
+          <a:ln>
+            <a:solidFill>
+              <a:schemeClr val="bg1"/>
+            </a:solidFill>
+          </a:ln>
+        </p:spPr>
+        <p:style>
+          <a:lnRef idx="2">
+            <a:schemeClr val="accent6"/>
+          </a:lnRef>
+          <a:fillRef idx="1">
+            <a:schemeClr val="lt1"/>
+          </a:fillRef>
+          <a:effectRef idx="0">
+            <a:schemeClr val="accent6"/>
+          </a:effectRef>
+          <a:fontRef idx="minor">
+            <a:schemeClr val="dk1"/>
+          </a:fontRef>
+        </p:style>
+        <p:txBody>
+          <a:bodyPr rtlCol="0" anchor="ctr"/>
+          <a:lstStyle/>
+          <a:p>
+            <a:pPr algn="ctr"/>
+            <a:r>
+              <a:rPr lang="fr-FR" sz="1200" dirty="0"/>
+              <a:t>Type 1b</a:t>
+            </a:r>
+            <a:endParaRPr lang="fr-BE" sz="1200" dirty="0"/>
+          </a:p>
+        </p:txBody>
+      </p:sp>
+      <p:sp>
+        <p:nvSpPr>
+          <p:cNvPr id="11" name="Rectangle : coins arrondis 10">
+            <a:extLst>
+              <a:ext uri="{FF2B5EF4-FFF2-40B4-BE49-F238E27FC236}">
+                <a16:creationId xmlns:a16="http://schemas.microsoft.com/office/drawing/2014/main" id="{872445A9-5714-B8C2-6D5C-853B90C901BE}"/>
+              </a:ext>
+            </a:extLst>
+          </p:cNvPr>
+          <p:cNvSpPr/>
+          <p:nvPr/>
+        </p:nvSpPr>
+        <p:spPr>
+          <a:xfrm>
+            <a:off x="7982064" y="1568546"/>
+            <a:ext cx="1859651" cy="194383"/>
+          </a:xfrm>
+          <a:prstGeom prst="roundRect">
+            <a:avLst/>
+          </a:prstGeom>
+          <a:solidFill>
+            <a:schemeClr val="bg2"/>
+          </a:solidFill>
+          <a:ln>
+            <a:solidFill>
+              <a:schemeClr val="bg1"/>
+            </a:solidFill>
+          </a:ln>
+        </p:spPr>
+        <p:style>
+          <a:lnRef idx="2">
+            <a:schemeClr val="accent6"/>
+          </a:lnRef>
+          <a:fillRef idx="1">
+            <a:schemeClr val="lt1"/>
+          </a:fillRef>
+          <a:effectRef idx="0">
+            <a:schemeClr val="accent6"/>
+          </a:effectRef>
+          <a:fontRef idx="minor">
+            <a:schemeClr val="dk1"/>
+          </a:fontRef>
+        </p:style>
+        <p:txBody>
+          <a:bodyPr rtlCol="0" anchor="ctr"/>
+          <a:lstStyle/>
+          <a:p>
+            <a:pPr algn="ctr"/>
+            <a:r>
+              <a:rPr lang="fr-FR" sz="1200" dirty="0"/>
+              <a:t>Type 2</a:t>
+            </a:r>
+            <a:endParaRPr lang="fr-BE" sz="1200" dirty="0"/>
+          </a:p>
+        </p:txBody>
+      </p:sp>
+      <p:sp>
+        <p:nvSpPr>
+          <p:cNvPr id="12" name="Rectangle : coins arrondis 11">
+            <a:extLst>
+              <a:ext uri="{FF2B5EF4-FFF2-40B4-BE49-F238E27FC236}">
+                <a16:creationId xmlns:a16="http://schemas.microsoft.com/office/drawing/2014/main" id="{00C193E2-9EE2-5C76-154D-C114C5015C71}"/>
+              </a:ext>
+            </a:extLst>
+          </p:cNvPr>
+          <p:cNvSpPr/>
+          <p:nvPr/>
+        </p:nvSpPr>
+        <p:spPr>
+          <a:xfrm>
+            <a:off x="10137710" y="1567932"/>
+            <a:ext cx="1859651" cy="194383"/>
+          </a:xfrm>
+          <a:prstGeom prst="roundRect">
+            <a:avLst/>
+          </a:prstGeom>
+          <a:solidFill>
+            <a:schemeClr val="bg2"/>
+          </a:solidFill>
+          <a:ln>
+            <a:solidFill>
+              <a:schemeClr val="bg1"/>
+            </a:solidFill>
+          </a:ln>
+        </p:spPr>
+        <p:style>
+          <a:lnRef idx="2">
+            <a:schemeClr val="accent6"/>
+          </a:lnRef>
+          <a:fillRef idx="1">
+            <a:schemeClr val="lt1"/>
+          </a:fillRef>
+          <a:effectRef idx="0">
+            <a:schemeClr val="accent6"/>
+          </a:effectRef>
+          <a:fontRef idx="minor">
+            <a:schemeClr val="dk1"/>
+          </a:fontRef>
+        </p:style>
+        <p:txBody>
+          <a:bodyPr rtlCol="0" anchor="ctr"/>
+          <a:lstStyle/>
+          <a:p>
+            <a:pPr algn="ctr"/>
+            <a:r>
+              <a:rPr lang="fr-FR" sz="1200" dirty="0"/>
+              <a:t>Type 3</a:t>
+            </a:r>
+            <a:endParaRPr lang="fr-BE" sz="1200" dirty="0"/>
+          </a:p>
+        </p:txBody>
+      </p:sp>
+      <p:pic>
+        <p:nvPicPr>
+          <p:cNvPr id="15" name="Image 14" descr="Une image contenant texte, capture d’écran, diagramme, Tracé&#10;&#10;Description générée automatiquement">
+            <a:extLst>
+              <a:ext uri="{FF2B5EF4-FFF2-40B4-BE49-F238E27FC236}">
+                <a16:creationId xmlns:a16="http://schemas.microsoft.com/office/drawing/2014/main" id="{22CEADCA-0D29-DCC2-EDC3-9AAF3F9C84AC}"/>
+              </a:ext>
+            </a:extLst>
+          </p:cNvPr>
+          <p:cNvPicPr>
+            <a:picLocks noChangeAspect="1"/>
+          </p:cNvPicPr>
+          <p:nvPr/>
+        </p:nvPicPr>
+        <p:blipFill>
+          <a:blip r:embed="rId6" cstate="print">
+            <a:extLst>
+              <a:ext uri="{28A0092B-C50C-407E-A947-70E740481C1C}">
+                <a14:useLocalDpi xmlns:a14="http://schemas.microsoft.com/office/drawing/2010/main" val="0"/>
+              </a:ext>
+            </a:extLst>
+          </a:blip>
+          <a:stretch>
+            <a:fillRect/>
+          </a:stretch>
+        </p:blipFill>
+        <p:spPr>
+          <a:xfrm>
+            <a:off x="7740303" y="5693492"/>
+            <a:ext cx="2286005" cy="1371603"/>
+          </a:xfrm>
+          <a:prstGeom prst="rect">
+            <a:avLst/>
+          </a:prstGeom>
+        </p:spPr>
+      </p:pic>
+      <p:pic>
+        <p:nvPicPr>
+          <p:cNvPr id="16" name="Image 15" descr="Une image contenant texte, diagramme, capture d’écran, ligne&#10;&#10;Description générée automatiquement">
+            <a:extLst>
+              <a:ext uri="{FF2B5EF4-FFF2-40B4-BE49-F238E27FC236}">
+                <a16:creationId xmlns:a16="http://schemas.microsoft.com/office/drawing/2014/main" id="{E9A16C79-7BBA-3489-3D41-A756A8E9DC11}"/>
+              </a:ext>
+            </a:extLst>
+          </p:cNvPr>
+          <p:cNvPicPr>
+            <a:picLocks noChangeAspect="1"/>
+          </p:cNvPicPr>
+          <p:nvPr/>
+        </p:nvPicPr>
+        <p:blipFill>
+          <a:blip r:embed="rId7" cstate="print">
+            <a:extLst>
+              <a:ext uri="{28A0092B-C50C-407E-A947-70E740481C1C}">
+                <a14:useLocalDpi xmlns:a14="http://schemas.microsoft.com/office/drawing/2010/main" val="0"/>
+              </a:ext>
+            </a:extLst>
+          </a:blip>
+          <a:stretch>
+            <a:fillRect/>
+          </a:stretch>
+        </p:blipFill>
+        <p:spPr>
+          <a:xfrm>
+            <a:off x="3408843" y="5700597"/>
+            <a:ext cx="2286005" cy="1371603"/>
+          </a:xfrm>
+          <a:prstGeom prst="rect">
+            <a:avLst/>
+          </a:prstGeom>
+        </p:spPr>
+      </p:pic>
+      <p:sp>
+        <p:nvSpPr>
+          <p:cNvPr id="18" name="Rectangle : coins arrondis 17">
+            <a:extLst>
+              <a:ext uri="{FF2B5EF4-FFF2-40B4-BE49-F238E27FC236}">
+                <a16:creationId xmlns:a16="http://schemas.microsoft.com/office/drawing/2014/main" id="{2E425472-F687-06F6-DAD7-C44B5F84185D}"/>
+              </a:ext>
+            </a:extLst>
+          </p:cNvPr>
+          <p:cNvSpPr/>
+          <p:nvPr/>
+        </p:nvSpPr>
+        <p:spPr>
+          <a:xfrm>
+            <a:off x="3759765" y="5533807"/>
+            <a:ext cx="1859651" cy="194383"/>
+          </a:xfrm>
+          <a:prstGeom prst="roundRect">
+            <a:avLst/>
+          </a:prstGeom>
+          <a:solidFill>
+            <a:schemeClr val="bg2"/>
+          </a:solidFill>
+          <a:ln>
+            <a:solidFill>
+              <a:schemeClr val="bg1"/>
+            </a:solidFill>
+          </a:ln>
+        </p:spPr>
+        <p:style>
+          <a:lnRef idx="2">
+            <a:schemeClr val="accent6"/>
+          </a:lnRef>
+          <a:fillRef idx="1">
+            <a:schemeClr val="lt1"/>
+          </a:fillRef>
+          <a:effectRef idx="0">
+            <a:schemeClr val="accent6"/>
+          </a:effectRef>
+          <a:fontRef idx="minor">
+            <a:schemeClr val="dk1"/>
+          </a:fontRef>
+        </p:style>
+        <p:txBody>
+          <a:bodyPr rtlCol="0" anchor="ctr"/>
+          <a:lstStyle/>
+          <a:p>
+            <a:pPr algn="ctr"/>
+            <a:r>
+              <a:rPr lang="fr-FR" sz="1200" dirty="0"/>
+              <a:t>Type 4</a:t>
+            </a:r>
+            <a:endParaRPr lang="fr-BE" sz="1200" dirty="0"/>
+          </a:p>
+        </p:txBody>
+      </p:sp>
+      <p:pic>
+        <p:nvPicPr>
+          <p:cNvPr id="26" name="Image 25" descr="Une image contenant texte, capture d’écran, ligne, diagramme&#10;&#10;Description générée automatiquement">
+            <a:extLst>
+              <a:ext uri="{FF2B5EF4-FFF2-40B4-BE49-F238E27FC236}">
+                <a16:creationId xmlns:a16="http://schemas.microsoft.com/office/drawing/2014/main" id="{92D2F2D0-0DE2-AF88-9F71-0B71CE798081}"/>
+              </a:ext>
+            </a:extLst>
+          </p:cNvPr>
+          <p:cNvPicPr>
+            <a:picLocks noChangeAspect="1"/>
+          </p:cNvPicPr>
+          <p:nvPr/>
+        </p:nvPicPr>
+        <p:blipFill>
+          <a:blip r:embed="rId8" cstate="print">
+            <a:extLst>
+              <a:ext uri="{28A0092B-C50C-407E-A947-70E740481C1C}">
+                <a14:useLocalDpi xmlns:a14="http://schemas.microsoft.com/office/drawing/2010/main" val="0"/>
+              </a:ext>
+            </a:extLst>
+          </a:blip>
+          <a:stretch>
+            <a:fillRect/>
+          </a:stretch>
+        </p:blipFill>
+        <p:spPr>
+          <a:xfrm>
+            <a:off x="5507143" y="1752639"/>
+            <a:ext cx="2286005" cy="1371603"/>
+          </a:xfrm>
+          <a:prstGeom prst="rect">
+            <a:avLst/>
+          </a:prstGeom>
+        </p:spPr>
+      </p:pic>
+      <p:sp>
+        <p:nvSpPr>
+          <p:cNvPr id="38" name="Accolade ouvrante 37"/>
+          <p:cNvSpPr/>
+          <p:nvPr/>
+        </p:nvSpPr>
+        <p:spPr>
+          <a:xfrm>
+            <a:off x="1099963" y="1760164"/>
+            <a:ext cx="344246" cy="5067591"/>
+          </a:xfrm>
+          <a:prstGeom prst="leftBrace">
+            <a:avLst>
+              <a:gd name="adj1" fmla="val 23958"/>
+              <a:gd name="adj2" fmla="val 50254"/>
+            </a:avLst>
+          </a:prstGeom>
+          <a:ln>
+            <a:solidFill>
+              <a:schemeClr val="tx1"/>
+            </a:solidFill>
+          </a:ln>
+        </p:spPr>
+        <p:style>
+          <a:lnRef idx="1">
+            <a:schemeClr val="accent1"/>
+          </a:lnRef>
+          <a:fillRef idx="0">
+            <a:schemeClr val="accent1"/>
+          </a:fillRef>
+          <a:effectRef idx="0">
+            <a:schemeClr val="accent1"/>
+          </a:effectRef>
+          <a:fontRef idx="minor">
+            <a:schemeClr val="tx1"/>
+          </a:fontRef>
+        </p:style>
+        <p:txBody>
+          <a:bodyPr rtlCol="0" anchor="ctr"/>
+          <a:lstStyle/>
+          <a:p>
+            <a:pPr algn="ctr"/>
+            <a:endParaRPr lang="fr-FR"/>
+          </a:p>
+        </p:txBody>
+      </p:sp>
+      <p:pic>
+        <p:nvPicPr>
+          <p:cNvPr id="4" name="Image 3" descr="Une image contenant texte, capture d’écran, Police, nombre&#10;&#10;Description générée automatiquement">
+            <a:extLst>
+              <a:ext uri="{FF2B5EF4-FFF2-40B4-BE49-F238E27FC236}">
+                <a16:creationId xmlns:a16="http://schemas.microsoft.com/office/drawing/2014/main" id="{3316D61E-27DF-A83E-8785-593BD6FB31BA}"/>
+              </a:ext>
+            </a:extLst>
+          </p:cNvPr>
+          <p:cNvPicPr>
+            <a:picLocks noChangeAspect="1"/>
+          </p:cNvPicPr>
+          <p:nvPr/>
+        </p:nvPicPr>
+        <p:blipFill>
+          <a:blip r:embed="rId9">
+            <a:extLst>
+              <a:ext uri="{28A0092B-C50C-407E-A947-70E740481C1C}">
+                <a14:useLocalDpi xmlns:a14="http://schemas.microsoft.com/office/drawing/2010/main" val="0"/>
+              </a:ext>
+            </a:extLst>
+          </a:blip>
+          <a:stretch>
+            <a:fillRect/>
+          </a:stretch>
+        </p:blipFill>
+        <p:spPr>
+          <a:xfrm>
+            <a:off x="10724628" y="3006126"/>
+            <a:ext cx="1356478" cy="2309060"/>
+          </a:xfrm>
+          <a:prstGeom prst="rect">
+            <a:avLst/>
+          </a:prstGeom>
+        </p:spPr>
+      </p:pic>
+      <p:pic>
+        <p:nvPicPr>
+          <p:cNvPr id="14" name="Image 13" descr="Une image contenant capture d’écran, diagramme, texte, Tracé&#10;&#10;Description générée automatiquement">
+            <a:extLst>
+              <a:ext uri="{FF2B5EF4-FFF2-40B4-BE49-F238E27FC236}">
+                <a16:creationId xmlns:a16="http://schemas.microsoft.com/office/drawing/2014/main" id="{7189D902-F122-10B0-B146-3A5E7BCE1611}"/>
+              </a:ext>
+            </a:extLst>
+          </p:cNvPr>
+          <p:cNvPicPr>
+            <a:picLocks noChangeAspect="1"/>
+          </p:cNvPicPr>
+          <p:nvPr/>
+        </p:nvPicPr>
+        <p:blipFill>
+          <a:blip r:embed="rId10" cstate="print">
+            <a:extLst>
+              <a:ext uri="{28A0092B-C50C-407E-A947-70E740481C1C}">
+                <a14:useLocalDpi xmlns:a14="http://schemas.microsoft.com/office/drawing/2010/main" val="0"/>
+              </a:ext>
+            </a:extLst>
+          </a:blip>
+          <a:stretch>
+            <a:fillRect/>
+          </a:stretch>
+        </p:blipFill>
+        <p:spPr>
+          <a:xfrm>
+            <a:off x="5507568" y="2770914"/>
+            <a:ext cx="2286005" cy="1371603"/>
+          </a:xfrm>
+          <a:prstGeom prst="rect">
+            <a:avLst/>
+          </a:prstGeom>
+        </p:spPr>
+      </p:pic>
+      <p:pic>
+        <p:nvPicPr>
+          <p:cNvPr id="17" name="Image 16" descr="Une image contenant diagramme, texte, ligne, capture d’écran&#10;&#10;Description générée automatiquement">
+            <a:extLst>
+              <a:ext uri="{FF2B5EF4-FFF2-40B4-BE49-F238E27FC236}">
+                <a16:creationId xmlns:a16="http://schemas.microsoft.com/office/drawing/2014/main" id="{469C0EB1-6BE3-4766-F26D-B41C23DA4A63}"/>
+              </a:ext>
+            </a:extLst>
+          </p:cNvPr>
+          <p:cNvPicPr>
+            <a:picLocks noChangeAspect="1"/>
+          </p:cNvPicPr>
+          <p:nvPr/>
+        </p:nvPicPr>
+        <p:blipFill>
+          <a:blip r:embed="rId11" cstate="print">
+            <a:extLst>
+              <a:ext uri="{28A0092B-C50C-407E-A947-70E740481C1C}">
+                <a14:useLocalDpi xmlns:a14="http://schemas.microsoft.com/office/drawing/2010/main" val="0"/>
+              </a:ext>
+            </a:extLst>
+          </a:blip>
+          <a:stretch>
+            <a:fillRect/>
+          </a:stretch>
+        </p:blipFill>
+        <p:spPr>
+          <a:xfrm>
+            <a:off x="3419496" y="1752370"/>
+            <a:ext cx="2286005" cy="1371603"/>
+          </a:xfrm>
+          <a:prstGeom prst="rect">
+            <a:avLst/>
+          </a:prstGeom>
+        </p:spPr>
+      </p:pic>
+      <p:pic>
+        <p:nvPicPr>
+          <p:cNvPr id="19" name="Image 18" descr="Une image contenant texte, capture d’écran, diagramme, ligne&#10;&#10;Description générée automatiquement">
+            <a:extLst>
+              <a:ext uri="{FF2B5EF4-FFF2-40B4-BE49-F238E27FC236}">
+                <a16:creationId xmlns:a16="http://schemas.microsoft.com/office/drawing/2014/main" id="{7A195413-D3CB-6496-8FA1-37741929BDEF}"/>
+              </a:ext>
+            </a:extLst>
+          </p:cNvPr>
+          <p:cNvPicPr>
+            <a:picLocks noChangeAspect="1"/>
+          </p:cNvPicPr>
+          <p:nvPr/>
+        </p:nvPicPr>
+        <p:blipFill>
+          <a:blip r:embed="rId12" cstate="print">
+            <a:extLst>
+              <a:ext uri="{28A0092B-C50C-407E-A947-70E740481C1C}">
+                <a14:useLocalDpi xmlns:a14="http://schemas.microsoft.com/office/drawing/2010/main" val="0"/>
+              </a:ext>
+            </a:extLst>
+          </a:blip>
+          <a:stretch>
+            <a:fillRect/>
+          </a:stretch>
+        </p:blipFill>
+        <p:spPr>
+          <a:xfrm>
+            <a:off x="3406918" y="2775202"/>
+            <a:ext cx="2286005" cy="1371603"/>
+          </a:xfrm>
+          <a:prstGeom prst="rect">
+            <a:avLst/>
+          </a:prstGeom>
+        </p:spPr>
+      </p:pic>
+      <p:pic>
+        <p:nvPicPr>
+          <p:cNvPr id="20" name="Image 19" descr="Une image contenant texte, capture d’écran, ligne, diagramme&#10;&#10;Description générée automatiquement">
+            <a:extLst>
+              <a:ext uri="{FF2B5EF4-FFF2-40B4-BE49-F238E27FC236}">
+                <a16:creationId xmlns:a16="http://schemas.microsoft.com/office/drawing/2014/main" id="{2B8C7244-5E25-1EC3-AF84-12E36A7431AE}"/>
+              </a:ext>
+            </a:extLst>
+          </p:cNvPr>
+          <p:cNvPicPr>
+            <a:picLocks noChangeAspect="1"/>
+          </p:cNvPicPr>
+          <p:nvPr/>
+        </p:nvPicPr>
+        <p:blipFill>
+          <a:blip r:embed="rId13" cstate="print">
+            <a:extLst>
+              <a:ext uri="{28A0092B-C50C-407E-A947-70E740481C1C}">
+                <a14:useLocalDpi xmlns:a14="http://schemas.microsoft.com/office/drawing/2010/main" val="0"/>
+              </a:ext>
+            </a:extLst>
+          </a:blip>
+          <a:stretch>
+            <a:fillRect/>
+          </a:stretch>
+        </p:blipFill>
+        <p:spPr>
+          <a:xfrm>
+            <a:off x="3401572" y="3776308"/>
+            <a:ext cx="2286005" cy="1371603"/>
+          </a:xfrm>
+          <a:prstGeom prst="rect">
+            <a:avLst/>
+          </a:prstGeom>
+        </p:spPr>
+      </p:pic>
+      <p:pic>
+        <p:nvPicPr>
+          <p:cNvPr id="21" name="Image 20">
+            <a:extLst>
+              <a:ext uri="{FF2B5EF4-FFF2-40B4-BE49-F238E27FC236}">
+                <a16:creationId xmlns:a16="http://schemas.microsoft.com/office/drawing/2014/main" id="{3A574D19-8F2D-C547-75AB-88C7BAB768ED}"/>
+              </a:ext>
+            </a:extLst>
+          </p:cNvPr>
+          <p:cNvPicPr>
+            <a:picLocks noChangeAspect="1"/>
+          </p:cNvPicPr>
+          <p:nvPr/>
+        </p:nvPicPr>
+        <p:blipFill>
+          <a:blip r:embed="rId14" cstate="print">
+            <a:extLst>
+              <a:ext uri="{28A0092B-C50C-407E-A947-70E740481C1C}">
+                <a14:useLocalDpi xmlns:a14="http://schemas.microsoft.com/office/drawing/2010/main" val="0"/>
+              </a:ext>
+            </a:extLst>
+          </a:blip>
+          <a:stretch>
+            <a:fillRect/>
+          </a:stretch>
+        </p:blipFill>
+        <p:spPr>
+          <a:xfrm>
+            <a:off x="1355010" y="1733796"/>
+            <a:ext cx="2286005" cy="1371603"/>
+          </a:xfrm>
+          <a:prstGeom prst="rect">
+            <a:avLst/>
+          </a:prstGeom>
+        </p:spPr>
+      </p:pic>
       <p:grpSp>
         <p:nvGrpSpPr>
-          <p:cNvPr id="41" name="Groupe 40">
+          <p:cNvPr id="8" name="Groupe 7">
             <a:extLst>
               <a:ext uri="{FF2B5EF4-FFF2-40B4-BE49-F238E27FC236}">
-                <a16:creationId xmlns:a16="http://schemas.microsoft.com/office/drawing/2014/main" id="{4B2998AE-2324-A36A-ABFB-80D96910ED30}"/>
+                <a16:creationId xmlns:a16="http://schemas.microsoft.com/office/drawing/2014/main" id="{B0BC3DC7-50E8-4C33-800B-38CD7CF1EC95}"/>
               </a:ext>
             </a:extLst>
           </p:cNvPr>
@@ -3939,22 +4767,28 @@
         </p:nvGrpSpPr>
         <p:grpSpPr>
           <a:xfrm>
-            <a:off x="5661642" y="4385388"/>
-            <a:ext cx="2091997" cy="807932"/>
-            <a:chOff x="3391886" y="5556653"/>
-            <a:chExt cx="2690688" cy="1051225"/>
+            <a:off x="5679687" y="4291312"/>
+            <a:ext cx="2341984" cy="665809"/>
+            <a:chOff x="5687577" y="4898601"/>
+            <a:chExt cx="2341984" cy="665809"/>
           </a:xfrm>
         </p:grpSpPr>
         <p:sp>
           <p:nvSpPr>
-            <p:cNvPr id="42" name="Flèche courbée vers le haut 93"/>
+            <p:cNvPr id="3" name="Flèche courbée vers le haut 93">
+              <a:extLst>
+                <a:ext uri="{FF2B5EF4-FFF2-40B4-BE49-F238E27FC236}">
+                  <a16:creationId xmlns:a16="http://schemas.microsoft.com/office/drawing/2014/main" id="{EE05CFDE-118F-A840-503A-465688E240A7}"/>
+                </a:ext>
+              </a:extLst>
+            </p:cNvPr>
             <p:cNvSpPr/>
             <p:nvPr/>
           </p:nvSpPr>
           <p:spPr>
             <a:xfrm rot="2278782">
-              <a:off x="3391886" y="6338596"/>
-              <a:ext cx="1702423" cy="253354"/>
+              <a:off x="5687577" y="5309439"/>
+              <a:ext cx="1318161" cy="167430"/>
             </a:xfrm>
             <a:prstGeom prst="curvedUpArrow">
               <a:avLst/>
@@ -4000,14 +4834,20 @@
         </p:sp>
         <p:sp useBgFill="1">
           <p:nvSpPr>
-            <p:cNvPr id="43" name="Ellipse 42"/>
+            <p:cNvPr id="5" name="Ellipse 4">
+              <a:extLst>
+                <a:ext uri="{FF2B5EF4-FFF2-40B4-BE49-F238E27FC236}">
+                  <a16:creationId xmlns:a16="http://schemas.microsoft.com/office/drawing/2014/main" id="{41AE1E97-9974-B374-5CE1-71FC92BAD43F}"/>
+                </a:ext>
+              </a:extLst>
+            </p:cNvPr>
             <p:cNvSpPr/>
             <p:nvPr/>
           </p:nvSpPr>
           <p:spPr>
             <a:xfrm>
-              <a:off x="3914306" y="5565598"/>
-              <a:ext cx="1723697" cy="1042280"/>
+              <a:off x="6136305" y="4898601"/>
+              <a:ext cx="1545077" cy="665809"/>
             </a:xfrm>
             <a:prstGeom prst="ellipse">
               <a:avLst/>
@@ -4043,33 +4883,30 @@
             <a:p>
               <a:pPr algn="ctr"/>
               <a:r>
-                <a:rPr lang="fr-FR" sz="1000" b="1" dirty="0">
+                <a:rPr lang="fr-FR" sz="900" b="1" dirty="0">
                   <a:solidFill>
-                    <a:schemeClr val="accent1">
-                      <a:lumMod val="60000"/>
-                      <a:lumOff val="40000"/>
+                    <a:schemeClr val="bg2">
+                      <a:lumMod val="50000"/>
                     </a:schemeClr>
                   </a:solidFill>
                 </a:rPr>
                 <a:t>Co-</a:t>
               </a:r>
               <a:r>
-                <a:rPr lang="fr-FR" sz="1000" b="1" dirty="0" err="1">
+                <a:rPr lang="fr-FR" sz="900" b="1" dirty="0" err="1">
                   <a:solidFill>
-                    <a:schemeClr val="accent1">
-                      <a:lumMod val="60000"/>
-                      <a:lumOff val="40000"/>
+                    <a:schemeClr val="bg2">
+                      <a:lumMod val="50000"/>
                     </a:schemeClr>
                   </a:solidFill>
                 </a:rPr>
                 <a:t>product</a:t>
               </a:r>
               <a:r>
-                <a:rPr lang="fr-FR" sz="1000" b="1" dirty="0">
+                <a:rPr lang="fr-FR" sz="900" b="1" dirty="0">
                   <a:solidFill>
-                    <a:schemeClr val="accent1">
-                      <a:lumMod val="60000"/>
-                      <a:lumOff val="40000"/>
+                    <a:schemeClr val="bg2">
+                      <a:lumMod val="50000"/>
                     </a:schemeClr>
                   </a:solidFill>
                 </a:rPr>
@@ -4079,21 +4916,19 @@
             <a:p>
               <a:pPr algn="ctr"/>
               <a:r>
-                <a:rPr lang="fr-FR" sz="1000" b="1" dirty="0" err="1">
+                <a:rPr lang="fr-FR" sz="900" b="1" dirty="0" err="1">
                   <a:solidFill>
-                    <a:schemeClr val="accent1">
-                      <a:lumMod val="60000"/>
-                      <a:lumOff val="40000"/>
+                    <a:schemeClr val="bg2">
+                      <a:lumMod val="50000"/>
                     </a:schemeClr>
                   </a:solidFill>
                 </a:rPr>
                 <a:t>supply</a:t>
               </a:r>
-              <a:endParaRPr lang="fr-FR" sz="1000" b="1" dirty="0">
+              <a:endParaRPr lang="fr-FR" sz="900" b="1" dirty="0">
                 <a:solidFill>
-                  <a:schemeClr val="accent1">
-                    <a:lumMod val="60000"/>
-                    <a:lumOff val="40000"/>
+                  <a:schemeClr val="bg2">
+                    <a:lumMod val="50000"/>
                   </a:schemeClr>
                 </a:solidFill>
               </a:endParaRPr>
@@ -4101,11 +4936,10 @@
             <a:p>
               <a:pPr algn="ctr"/>
               <a:r>
-                <a:rPr lang="fr-FR" sz="600" b="1" dirty="0">
+                <a:rPr lang="fr-FR" sz="400" b="1" dirty="0">
                   <a:solidFill>
-                    <a:schemeClr val="tx1">
-                      <a:lumMod val="65000"/>
-                      <a:lumOff val="35000"/>
+                    <a:schemeClr val="bg2">
+                      <a:lumMod val="50000"/>
                     </a:schemeClr>
                   </a:solidFill>
                 </a:rPr>
@@ -4115,76 +4949,84 @@
             <a:p>
               <a:pPr algn="ctr"/>
               <a:r>
-                <a:rPr lang="fr-FR" sz="1000" b="1" dirty="0" err="1">
+                <a:rPr lang="fr-FR" sz="900" b="1" dirty="0" err="1">
                   <a:solidFill>
-                    <a:schemeClr val="accent2">
-                      <a:lumMod val="60000"/>
-                      <a:lumOff val="40000"/>
+                    <a:schemeClr val="bg2">
+                      <a:lumMod val="50000"/>
                     </a:schemeClr>
                   </a:solidFill>
                 </a:rPr>
                 <a:t>Oil</a:t>
               </a:r>
               <a:r>
-                <a:rPr lang="fr-FR" sz="1000" b="1" dirty="0">
+                <a:rPr lang="fr-FR" sz="900" b="1">
                   <a:solidFill>
-                    <a:schemeClr val="accent2">
-                      <a:lumMod val="60000"/>
-                      <a:lumOff val="40000"/>
+                    <a:schemeClr val="bg2">
+                      <a:lumMod val="50000"/>
+                    </a:schemeClr>
+                  </a:solidFill>
+                </a:rPr>
+                <a:t> or </a:t>
+              </a:r>
+              <a:r>
+                <a:rPr lang="fr-FR" sz="900" b="1" dirty="0" err="1">
+                  <a:solidFill>
+                    <a:schemeClr val="bg2">
+                      <a:lumMod val="50000"/>
+                    </a:schemeClr>
+                  </a:solidFill>
+                </a:rPr>
+                <a:t>sugar</a:t>
+              </a:r>
+              <a:r>
+                <a:rPr lang="fr-FR" sz="900" b="1" dirty="0">
+                  <a:solidFill>
+                    <a:schemeClr val="bg2">
+                      <a:lumMod val="50000"/>
                     </a:schemeClr>
                   </a:solidFill>
                 </a:rPr>
                 <a:t> </a:t>
               </a:r>
               <a:r>
-                <a:rPr lang="fr-FR" sz="1000" b="1" dirty="0" err="1">
+                <a:rPr lang="fr-FR" sz="900" b="1" dirty="0" err="1">
                   <a:solidFill>
-                    <a:schemeClr val="accent2">
-                      <a:lumMod val="60000"/>
-                      <a:lumOff val="40000"/>
+                    <a:schemeClr val="bg2">
+                      <a:lumMod val="50000"/>
                     </a:schemeClr>
                   </a:solidFill>
                 </a:rPr>
                 <a:t>crops</a:t>
               </a:r>
               <a:r>
-                <a:rPr lang="fr-FR" sz="1000" b="1" dirty="0">
+                <a:rPr lang="fr-FR" sz="900" b="1" dirty="0">
                   <a:solidFill>
-                    <a:schemeClr val="accent2">
-                      <a:lumMod val="60000"/>
-                      <a:lumOff val="40000"/>
+                    <a:schemeClr val="bg2">
+                      <a:lumMod val="50000"/>
                     </a:schemeClr>
                   </a:solidFill>
                 </a:rPr>
-                <a:t> </a:t>
-              </a:r>
-            </a:p>
-            <a:p>
-              <a:pPr algn="ctr"/>
-              <a:r>
-                <a:rPr lang="fr-FR" sz="1000" b="1" dirty="0">
-                  <a:solidFill>
-                    <a:schemeClr val="accent2">
-                      <a:lumMod val="60000"/>
-                      <a:lumOff val="40000"/>
-                    </a:schemeClr>
-                  </a:solidFill>
-                </a:rPr>
-                <a:t>substitution</a:t>
+                <a:t> substitution</a:t>
               </a:r>
             </a:p>
           </p:txBody>
         </p:sp>
         <p:sp>
           <p:nvSpPr>
-            <p:cNvPr id="45" name="Flèche courbée vers le haut 29"/>
+            <p:cNvPr id="6" name="Flèche courbée vers le haut 29">
+              <a:extLst>
+                <a:ext uri="{FF2B5EF4-FFF2-40B4-BE49-F238E27FC236}">
+                  <a16:creationId xmlns:a16="http://schemas.microsoft.com/office/drawing/2014/main" id="{2FAA9BCE-A9CE-7A4D-8444-B94F4134D594}"/>
+                </a:ext>
+              </a:extLst>
+            </p:cNvPr>
             <p:cNvSpPr/>
             <p:nvPr/>
           </p:nvSpPr>
           <p:spPr>
             <a:xfrm rot="12937591">
-              <a:off x="4380151" y="5556653"/>
-              <a:ext cx="1702423" cy="253354"/>
+              <a:off x="6711400" y="4903846"/>
+              <a:ext cx="1318161" cy="167430"/>
             </a:xfrm>
             <a:prstGeom prst="curvedUpArrow">
               <a:avLst/>
@@ -4229,846 +5071,6 @@
           </p:txBody>
         </p:sp>
       </p:grpSp>
-      <p:pic>
-        <p:nvPicPr>
-          <p:cNvPr id="51" name="Image 50" descr="Une image contenant texte, capture d’écran, diagramme, Tracé&#10;&#10;Description générée automatiquement">
-            <a:extLst>
-              <a:ext uri="{FF2B5EF4-FFF2-40B4-BE49-F238E27FC236}">
-                <a16:creationId xmlns:a16="http://schemas.microsoft.com/office/drawing/2014/main" id="{5CAB7067-76B2-3FA0-0403-EA2CF79EA34B}"/>
-              </a:ext>
-            </a:extLst>
-          </p:cNvPr>
-          <p:cNvPicPr>
-            <a:picLocks noChangeAspect="1"/>
-          </p:cNvPicPr>
-          <p:nvPr/>
-        </p:nvPicPr>
-        <p:blipFill>
-          <a:blip r:embed="rId2" cstate="print">
-            <a:extLst>
-              <a:ext uri="{28A0092B-C50C-407E-A947-70E740481C1C}">
-                <a14:useLocalDpi xmlns:a14="http://schemas.microsoft.com/office/drawing/2010/main" val="0"/>
-              </a:ext>
-            </a:extLst>
-          </a:blip>
-          <a:stretch>
-            <a:fillRect/>
-          </a:stretch>
-        </p:blipFill>
-        <p:spPr>
-          <a:xfrm>
-            <a:off x="9797928" y="1752370"/>
-            <a:ext cx="2286005" cy="1371603"/>
-          </a:xfrm>
-          <a:prstGeom prst="rect">
-            <a:avLst/>
-          </a:prstGeom>
-        </p:spPr>
-      </p:pic>
-      <p:pic>
-        <p:nvPicPr>
-          <p:cNvPr id="55" name="Image 54" descr="Une image contenant texte, ligne, diagramme, capture d’écran&#10;&#10;Description générée automatiquement">
-            <a:extLst>
-              <a:ext uri="{FF2B5EF4-FFF2-40B4-BE49-F238E27FC236}">
-                <a16:creationId xmlns:a16="http://schemas.microsoft.com/office/drawing/2014/main" id="{DA187E9F-21E7-456E-CB3C-73F98199493F}"/>
-              </a:ext>
-            </a:extLst>
-          </p:cNvPr>
-          <p:cNvPicPr>
-            <a:picLocks noChangeAspect="1"/>
-          </p:cNvPicPr>
-          <p:nvPr/>
-        </p:nvPicPr>
-        <p:blipFill>
-          <a:blip r:embed="rId3" cstate="print">
-            <a:extLst>
-              <a:ext uri="{28A0092B-C50C-407E-A947-70E740481C1C}">
-                <a14:useLocalDpi xmlns:a14="http://schemas.microsoft.com/office/drawing/2010/main" val="0"/>
-              </a:ext>
-            </a:extLst>
-          </a:blip>
-          <a:stretch>
-            <a:fillRect/>
-          </a:stretch>
-        </p:blipFill>
-        <p:spPr>
-          <a:xfrm>
-            <a:off x="7653276" y="1752990"/>
-            <a:ext cx="2286005" cy="1371603"/>
-          </a:xfrm>
-          <a:prstGeom prst="rect">
-            <a:avLst/>
-          </a:prstGeom>
-        </p:spPr>
-      </p:pic>
-      <p:pic>
-        <p:nvPicPr>
-          <p:cNvPr id="58" name="Image 57" descr="Une image contenant texte, capture d’écran, ligne, diagramme&#10;&#10;Description générée automatiquement">
-            <a:extLst>
-              <a:ext uri="{FF2B5EF4-FFF2-40B4-BE49-F238E27FC236}">
-                <a16:creationId xmlns:a16="http://schemas.microsoft.com/office/drawing/2014/main" id="{0254ABF5-CB8F-5934-2D5E-33788432AE30}"/>
-              </a:ext>
-            </a:extLst>
-          </p:cNvPr>
-          <p:cNvPicPr>
-            <a:picLocks noChangeAspect="1"/>
-          </p:cNvPicPr>
-          <p:nvPr/>
-        </p:nvPicPr>
-        <p:blipFill>
-          <a:blip r:embed="rId4" cstate="print">
-            <a:extLst>
-              <a:ext uri="{28A0092B-C50C-407E-A947-70E740481C1C}">
-                <a14:useLocalDpi xmlns:a14="http://schemas.microsoft.com/office/drawing/2010/main" val="0"/>
-              </a:ext>
-            </a:extLst>
-          </a:blip>
-          <a:stretch>
-            <a:fillRect/>
-          </a:stretch>
-        </p:blipFill>
-        <p:spPr>
-          <a:xfrm>
-            <a:off x="7686069" y="2769372"/>
-            <a:ext cx="2286005" cy="1371603"/>
-          </a:xfrm>
-          <a:prstGeom prst="rect">
-            <a:avLst/>
-          </a:prstGeom>
-        </p:spPr>
-      </p:pic>
-      <p:pic>
-        <p:nvPicPr>
-          <p:cNvPr id="60" name="Image 59" descr="Une image contenant texte, capture d’écran, ligne, diagramme&#10;&#10;Description générée automatiquement">
-            <a:extLst>
-              <a:ext uri="{FF2B5EF4-FFF2-40B4-BE49-F238E27FC236}">
-                <a16:creationId xmlns:a16="http://schemas.microsoft.com/office/drawing/2014/main" id="{92D2F2D0-0DE2-AF88-9F71-0B71CE798081}"/>
-              </a:ext>
-            </a:extLst>
-          </p:cNvPr>
-          <p:cNvPicPr>
-            <a:picLocks noChangeAspect="1"/>
-          </p:cNvPicPr>
-          <p:nvPr/>
-        </p:nvPicPr>
-        <p:blipFill>
-          <a:blip r:embed="rId5" cstate="print">
-            <a:extLst>
-              <a:ext uri="{28A0092B-C50C-407E-A947-70E740481C1C}">
-                <a14:useLocalDpi xmlns:a14="http://schemas.microsoft.com/office/drawing/2010/main" val="0"/>
-              </a:ext>
-            </a:extLst>
-          </a:blip>
-          <a:stretch>
-            <a:fillRect/>
-          </a:stretch>
-        </p:blipFill>
-        <p:spPr>
-          <a:xfrm>
-            <a:off x="5470740" y="1745315"/>
-            <a:ext cx="2286005" cy="1371603"/>
-          </a:xfrm>
-          <a:prstGeom prst="rect">
-            <a:avLst/>
-          </a:prstGeom>
-        </p:spPr>
-      </p:pic>
-      <p:pic>
-        <p:nvPicPr>
-          <p:cNvPr id="62" name="Image 61" descr="Une image contenant capture d’écran, diagramme, texte, Tracé&#10;&#10;Description générée automatiquement">
-            <a:extLst>
-              <a:ext uri="{FF2B5EF4-FFF2-40B4-BE49-F238E27FC236}">
-                <a16:creationId xmlns:a16="http://schemas.microsoft.com/office/drawing/2014/main" id="{7189D902-F122-10B0-B146-3A5E7BCE1611}"/>
-              </a:ext>
-            </a:extLst>
-          </p:cNvPr>
-          <p:cNvPicPr>
-            <a:picLocks noChangeAspect="1"/>
-          </p:cNvPicPr>
-          <p:nvPr/>
-        </p:nvPicPr>
-        <p:blipFill>
-          <a:blip r:embed="rId6" cstate="print">
-            <a:extLst>
-              <a:ext uri="{28A0092B-C50C-407E-A947-70E740481C1C}">
-                <a14:useLocalDpi xmlns:a14="http://schemas.microsoft.com/office/drawing/2010/main" val="0"/>
-              </a:ext>
-            </a:extLst>
-          </a:blip>
-          <a:stretch>
-            <a:fillRect/>
-          </a:stretch>
-        </p:blipFill>
-        <p:spPr>
-          <a:xfrm>
-            <a:off x="5454298" y="2771511"/>
-            <a:ext cx="2286005" cy="1371603"/>
-          </a:xfrm>
-          <a:prstGeom prst="rect">
-            <a:avLst/>
-          </a:prstGeom>
-        </p:spPr>
-      </p:pic>
-      <p:pic>
-        <p:nvPicPr>
-          <p:cNvPr id="63" name="Image 62" descr="Une image contenant texte, capture d’écran, diagramme, ligne&#10;&#10;Description générée automatiquement">
-            <a:extLst>
-              <a:ext uri="{FF2B5EF4-FFF2-40B4-BE49-F238E27FC236}">
-                <a16:creationId xmlns:a16="http://schemas.microsoft.com/office/drawing/2014/main" id="{7A195413-D3CB-6496-8FA1-37741929BDEF}"/>
-              </a:ext>
-            </a:extLst>
-          </p:cNvPr>
-          <p:cNvPicPr>
-            <a:picLocks noChangeAspect="1"/>
-          </p:cNvPicPr>
-          <p:nvPr/>
-        </p:nvPicPr>
-        <p:blipFill>
-          <a:blip r:embed="rId7" cstate="print">
-            <a:extLst>
-              <a:ext uri="{28A0092B-C50C-407E-A947-70E740481C1C}">
-                <a14:useLocalDpi xmlns:a14="http://schemas.microsoft.com/office/drawing/2010/main" val="0"/>
-              </a:ext>
-            </a:extLst>
-          </a:blip>
-          <a:stretch>
-            <a:fillRect/>
-          </a:stretch>
-        </p:blipFill>
-        <p:spPr>
-          <a:xfrm>
-            <a:off x="3408843" y="1733752"/>
-            <a:ext cx="2286005" cy="1371603"/>
-          </a:xfrm>
-          <a:prstGeom prst="rect">
-            <a:avLst/>
-          </a:prstGeom>
-        </p:spPr>
-      </p:pic>
-      <p:pic>
-        <p:nvPicPr>
-          <p:cNvPr id="64" name="Image 63" descr="Une image contenant texte, diagramme, capture d’écran, ligne&#10;&#10;Description générée automatiquement">
-            <a:extLst>
-              <a:ext uri="{FF2B5EF4-FFF2-40B4-BE49-F238E27FC236}">
-                <a16:creationId xmlns:a16="http://schemas.microsoft.com/office/drawing/2014/main" id="{E9A16C79-7BBA-3489-3D41-A756A8E9DC11}"/>
-              </a:ext>
-            </a:extLst>
-          </p:cNvPr>
-          <p:cNvPicPr>
-            <a:picLocks noChangeAspect="1"/>
-          </p:cNvPicPr>
-          <p:nvPr/>
-        </p:nvPicPr>
-        <p:blipFill>
-          <a:blip r:embed="rId8" cstate="print">
-            <a:extLst>
-              <a:ext uri="{28A0092B-C50C-407E-A947-70E740481C1C}">
-                <a14:useLocalDpi xmlns:a14="http://schemas.microsoft.com/office/drawing/2010/main" val="0"/>
-              </a:ext>
-            </a:extLst>
-          </a:blip>
-          <a:stretch>
-            <a:fillRect/>
-          </a:stretch>
-        </p:blipFill>
-        <p:spPr>
-          <a:xfrm>
-            <a:off x="3392401" y="2751847"/>
-            <a:ext cx="2286005" cy="1371603"/>
-          </a:xfrm>
-          <a:prstGeom prst="rect">
-            <a:avLst/>
-          </a:prstGeom>
-        </p:spPr>
-      </p:pic>
-      <p:pic>
-        <p:nvPicPr>
-          <p:cNvPr id="65" name="Image 64" descr="Une image contenant texte, capture d’écran, ligne, diagramme&#10;&#10;Description générée automatiquement">
-            <a:extLst>
-              <a:ext uri="{FF2B5EF4-FFF2-40B4-BE49-F238E27FC236}">
-                <a16:creationId xmlns:a16="http://schemas.microsoft.com/office/drawing/2014/main" id="{2B8C7244-5E25-1EC3-AF84-12E36A7431AE}"/>
-              </a:ext>
-            </a:extLst>
-          </p:cNvPr>
-          <p:cNvPicPr>
-            <a:picLocks noChangeAspect="1"/>
-          </p:cNvPicPr>
-          <p:nvPr/>
-        </p:nvPicPr>
-        <p:blipFill>
-          <a:blip r:embed="rId9" cstate="print">
-            <a:extLst>
-              <a:ext uri="{28A0092B-C50C-407E-A947-70E740481C1C}">
-                <a14:useLocalDpi xmlns:a14="http://schemas.microsoft.com/office/drawing/2010/main" val="0"/>
-              </a:ext>
-            </a:extLst>
-          </a:blip>
-          <a:stretch>
-            <a:fillRect/>
-          </a:stretch>
-        </p:blipFill>
-        <p:spPr>
-          <a:xfrm>
-            <a:off x="3410646" y="3760349"/>
-            <a:ext cx="2286005" cy="1371603"/>
-          </a:xfrm>
-          <a:prstGeom prst="rect">
-            <a:avLst/>
-          </a:prstGeom>
-        </p:spPr>
-      </p:pic>
-      <p:pic>
-        <p:nvPicPr>
-          <p:cNvPr id="66" name="Image 65" descr="Une image contenant diagramme, texte, ligne, capture d’écran&#10;&#10;Description générée automatiquement">
-            <a:extLst>
-              <a:ext uri="{FF2B5EF4-FFF2-40B4-BE49-F238E27FC236}">
-                <a16:creationId xmlns:a16="http://schemas.microsoft.com/office/drawing/2014/main" id="{469C0EB1-6BE3-4766-F26D-B41C23DA4A63}"/>
-              </a:ext>
-            </a:extLst>
-          </p:cNvPr>
-          <p:cNvPicPr>
-            <a:picLocks noChangeAspect="1"/>
-          </p:cNvPicPr>
-          <p:nvPr/>
-        </p:nvPicPr>
-        <p:blipFill>
-          <a:blip r:embed="rId10" cstate="print">
-            <a:extLst>
-              <a:ext uri="{28A0092B-C50C-407E-A947-70E740481C1C}">
-                <a14:useLocalDpi xmlns:a14="http://schemas.microsoft.com/office/drawing/2010/main" val="0"/>
-              </a:ext>
-            </a:extLst>
-          </a:blip>
-          <a:stretch>
-            <a:fillRect/>
-          </a:stretch>
-        </p:blipFill>
-        <p:spPr>
-          <a:xfrm>
-            <a:off x="3414072" y="4778467"/>
-            <a:ext cx="2286005" cy="1371603"/>
-          </a:xfrm>
-          <a:prstGeom prst="rect">
-            <a:avLst/>
-          </a:prstGeom>
-        </p:spPr>
-      </p:pic>
-      <p:pic>
-        <p:nvPicPr>
-          <p:cNvPr id="67" name="Image 66">
-            <a:extLst>
-              <a:ext uri="{FF2B5EF4-FFF2-40B4-BE49-F238E27FC236}">
-                <a16:creationId xmlns:a16="http://schemas.microsoft.com/office/drawing/2014/main" id="{3A574D19-8F2D-C547-75AB-88C7BAB768ED}"/>
-              </a:ext>
-            </a:extLst>
-          </p:cNvPr>
-          <p:cNvPicPr>
-            <a:picLocks noChangeAspect="1"/>
-          </p:cNvPicPr>
-          <p:nvPr/>
-        </p:nvPicPr>
-        <p:blipFill>
-          <a:blip r:embed="rId11" cstate="print">
-            <a:extLst>
-              <a:ext uri="{28A0092B-C50C-407E-A947-70E740481C1C}">
-                <a14:useLocalDpi xmlns:a14="http://schemas.microsoft.com/office/drawing/2010/main" val="0"/>
-              </a:ext>
-            </a:extLst>
-          </a:blip>
-          <a:stretch>
-            <a:fillRect/>
-          </a:stretch>
-        </p:blipFill>
-        <p:spPr>
-          <a:xfrm>
-            <a:off x="1355010" y="1733796"/>
-            <a:ext cx="2286005" cy="1371603"/>
-          </a:xfrm>
-          <a:prstGeom prst="rect">
-            <a:avLst/>
-          </a:prstGeom>
-        </p:spPr>
-      </p:pic>
-      <p:pic>
-        <p:nvPicPr>
-          <p:cNvPr id="69" name="Image 68" descr="Une image contenant texte, capture d’écran, diagramme, Tracé&#10;&#10;Description générée automatiquement">
-            <a:extLst>
-              <a:ext uri="{FF2B5EF4-FFF2-40B4-BE49-F238E27FC236}">
-                <a16:creationId xmlns:a16="http://schemas.microsoft.com/office/drawing/2014/main" id="{22CEADCA-0D29-DCC2-EDC3-9AAF3F9C84AC}"/>
-              </a:ext>
-            </a:extLst>
-          </p:cNvPr>
-          <p:cNvPicPr>
-            <a:picLocks noChangeAspect="1"/>
-          </p:cNvPicPr>
-          <p:nvPr/>
-        </p:nvPicPr>
-        <p:blipFill>
-          <a:blip r:embed="rId12" cstate="print">
-            <a:extLst>
-              <a:ext uri="{28A0092B-C50C-407E-A947-70E740481C1C}">
-                <a14:useLocalDpi xmlns:a14="http://schemas.microsoft.com/office/drawing/2010/main" val="0"/>
-              </a:ext>
-            </a:extLst>
-          </a:blip>
-          <a:stretch>
-            <a:fillRect/>
-          </a:stretch>
-        </p:blipFill>
-        <p:spPr>
-          <a:xfrm>
-            <a:off x="7025804" y="5685463"/>
-            <a:ext cx="2286005" cy="1371603"/>
-          </a:xfrm>
-          <a:prstGeom prst="rect">
-            <a:avLst/>
-          </a:prstGeom>
-        </p:spPr>
-      </p:pic>
-      <p:pic>
-        <p:nvPicPr>
-          <p:cNvPr id="71" name="Image 70" descr="Une image contenant texte, diagramme, ligne, capture d’écran&#10;&#10;Description générée automatiquement">
-            <a:extLst>
-              <a:ext uri="{FF2B5EF4-FFF2-40B4-BE49-F238E27FC236}">
-                <a16:creationId xmlns:a16="http://schemas.microsoft.com/office/drawing/2014/main" id="{6CD2EA21-D9B0-FE97-543E-FF45B2945333}"/>
-              </a:ext>
-            </a:extLst>
-          </p:cNvPr>
-          <p:cNvPicPr>
-            <a:picLocks noChangeAspect="1"/>
-          </p:cNvPicPr>
-          <p:nvPr/>
-        </p:nvPicPr>
-        <p:blipFill>
-          <a:blip r:embed="rId13" cstate="print">
-            <a:extLst>
-              <a:ext uri="{28A0092B-C50C-407E-A947-70E740481C1C}">
-                <a14:useLocalDpi xmlns:a14="http://schemas.microsoft.com/office/drawing/2010/main" val="0"/>
-              </a:ext>
-            </a:extLst>
-          </a:blip>
-          <a:stretch>
-            <a:fillRect/>
-          </a:stretch>
-        </p:blipFill>
-        <p:spPr>
-          <a:xfrm>
-            <a:off x="9801711" y="5685463"/>
-            <a:ext cx="2286005" cy="1371603"/>
-          </a:xfrm>
-          <a:prstGeom prst="rect">
-            <a:avLst/>
-          </a:prstGeom>
-        </p:spPr>
-      </p:pic>
-      <p:sp>
-        <p:nvSpPr>
-          <p:cNvPr id="76" name="Rectangle : coins arrondis 75">
-            <a:extLst>
-              <a:ext uri="{FF2B5EF4-FFF2-40B4-BE49-F238E27FC236}">
-                <a16:creationId xmlns:a16="http://schemas.microsoft.com/office/drawing/2014/main" id="{0D70D76B-8077-18F5-FA1B-C4852E00F52F}"/>
-              </a:ext>
-            </a:extLst>
-          </p:cNvPr>
-          <p:cNvSpPr/>
-          <p:nvPr/>
-        </p:nvSpPr>
-        <p:spPr>
-          <a:xfrm>
-            <a:off x="7368427" y="5480448"/>
-            <a:ext cx="1859651" cy="194383"/>
-          </a:xfrm>
-          <a:prstGeom prst="roundRect">
-            <a:avLst/>
-          </a:prstGeom>
-          <a:solidFill>
-            <a:schemeClr val="bg2"/>
-          </a:solidFill>
-          <a:ln>
-            <a:solidFill>
-              <a:schemeClr val="bg1"/>
-            </a:solidFill>
-          </a:ln>
-        </p:spPr>
-        <p:style>
-          <a:lnRef idx="2">
-            <a:schemeClr val="accent6"/>
-          </a:lnRef>
-          <a:fillRef idx="1">
-            <a:schemeClr val="lt1"/>
-          </a:fillRef>
-          <a:effectRef idx="0">
-            <a:schemeClr val="accent6"/>
-          </a:effectRef>
-          <a:fontRef idx="minor">
-            <a:schemeClr val="dk1"/>
-          </a:fontRef>
-        </p:style>
-        <p:txBody>
-          <a:bodyPr rtlCol="0" anchor="ctr"/>
-          <a:lstStyle/>
-          <a:p>
-            <a:pPr algn="ctr"/>
-            <a:r>
-              <a:rPr lang="fr-FR" sz="1200" dirty="0"/>
-              <a:t>Type 3</a:t>
-            </a:r>
-            <a:endParaRPr lang="fr-BE" sz="1200" dirty="0"/>
-          </a:p>
-        </p:txBody>
-      </p:sp>
-      <p:sp>
-        <p:nvSpPr>
-          <p:cNvPr id="77" name="Rectangle : coins arrondis 76">
-            <a:extLst>
-              <a:ext uri="{FF2B5EF4-FFF2-40B4-BE49-F238E27FC236}">
-                <a16:creationId xmlns:a16="http://schemas.microsoft.com/office/drawing/2014/main" id="{E469FF62-D374-886F-7F13-D89020C84F31}"/>
-              </a:ext>
-            </a:extLst>
-          </p:cNvPr>
-          <p:cNvSpPr/>
-          <p:nvPr/>
-        </p:nvSpPr>
-        <p:spPr>
-          <a:xfrm>
-            <a:off x="10162211" y="5480447"/>
-            <a:ext cx="1859651" cy="194383"/>
-          </a:xfrm>
-          <a:prstGeom prst="roundRect">
-            <a:avLst/>
-          </a:prstGeom>
-          <a:solidFill>
-            <a:schemeClr val="bg2"/>
-          </a:solidFill>
-          <a:ln>
-            <a:solidFill>
-              <a:schemeClr val="bg1"/>
-            </a:solidFill>
-          </a:ln>
-        </p:spPr>
-        <p:style>
-          <a:lnRef idx="2">
-            <a:schemeClr val="accent6"/>
-          </a:lnRef>
-          <a:fillRef idx="1">
-            <a:schemeClr val="lt1"/>
-          </a:fillRef>
-          <a:effectRef idx="0">
-            <a:schemeClr val="accent6"/>
-          </a:effectRef>
-          <a:fontRef idx="minor">
-            <a:schemeClr val="dk1"/>
-          </a:fontRef>
-        </p:style>
-        <p:txBody>
-          <a:bodyPr rtlCol="0" anchor="ctr"/>
-          <a:lstStyle/>
-          <a:p>
-            <a:pPr algn="ctr"/>
-            <a:r>
-              <a:rPr lang="fr-FR" sz="1200" dirty="0"/>
-              <a:t>Type 6</a:t>
-            </a:r>
-            <a:endParaRPr lang="fr-BE" sz="1200" dirty="0"/>
-          </a:p>
-        </p:txBody>
-      </p:sp>
-      <p:pic>
-        <p:nvPicPr>
-          <p:cNvPr id="78" name="Image 77">
-            <a:extLst>
-              <a:ext uri="{FF2B5EF4-FFF2-40B4-BE49-F238E27FC236}">
-                <a16:creationId xmlns:a16="http://schemas.microsoft.com/office/drawing/2014/main" id="{69F43619-F709-32C4-1EBC-C68E4CAE8702}"/>
-              </a:ext>
-            </a:extLst>
-          </p:cNvPr>
-          <p:cNvPicPr>
-            <a:picLocks noChangeAspect="1"/>
-          </p:cNvPicPr>
-          <p:nvPr/>
-        </p:nvPicPr>
-        <p:blipFill>
-          <a:blip r:embed="rId14">
-            <a:extLst>
-              <a:ext uri="{28A0092B-C50C-407E-A947-70E740481C1C}">
-                <a14:useLocalDpi xmlns:a14="http://schemas.microsoft.com/office/drawing/2010/main" val="0"/>
-              </a:ext>
-            </a:extLst>
-          </a:blip>
-          <a:stretch>
-            <a:fillRect/>
-          </a:stretch>
-        </p:blipFill>
-        <p:spPr>
-          <a:xfrm>
-            <a:off x="1747262" y="6067032"/>
-            <a:ext cx="3581710" cy="358171"/>
-          </a:xfrm>
-          <a:prstGeom prst="rect">
-            <a:avLst/>
-          </a:prstGeom>
-        </p:spPr>
-      </p:pic>
-      <p:pic>
-        <p:nvPicPr>
-          <p:cNvPr id="81" name="Image 80">
-            <a:extLst>
-              <a:ext uri="{FF2B5EF4-FFF2-40B4-BE49-F238E27FC236}">
-                <a16:creationId xmlns:a16="http://schemas.microsoft.com/office/drawing/2014/main" id="{8EB9C850-5510-1933-6FDF-8D0DA1278926}"/>
-              </a:ext>
-            </a:extLst>
-          </p:cNvPr>
-          <p:cNvPicPr>
-            <a:picLocks noChangeAspect="1"/>
-          </p:cNvPicPr>
-          <p:nvPr/>
-        </p:nvPicPr>
-        <p:blipFill>
-          <a:blip r:embed="rId15">
-            <a:extLst>
-              <a:ext uri="{28A0092B-C50C-407E-A947-70E740481C1C}">
-                <a14:useLocalDpi xmlns:a14="http://schemas.microsoft.com/office/drawing/2010/main" val="0"/>
-              </a:ext>
-            </a:extLst>
-          </a:blip>
-          <a:stretch>
-            <a:fillRect/>
-          </a:stretch>
-        </p:blipFill>
-        <p:spPr>
-          <a:xfrm>
-            <a:off x="1745722" y="6425247"/>
-            <a:ext cx="4655078" cy="374472"/>
-          </a:xfrm>
-          <a:prstGeom prst="rect">
-            <a:avLst/>
-          </a:prstGeom>
-        </p:spPr>
-      </p:pic>
-      <p:sp>
-        <p:nvSpPr>
-          <p:cNvPr id="7" name="Rectangle : coins arrondis 6">
-            <a:extLst>
-              <a:ext uri="{FF2B5EF4-FFF2-40B4-BE49-F238E27FC236}">
-                <a16:creationId xmlns:a16="http://schemas.microsoft.com/office/drawing/2014/main" id="{E01C0012-5748-F2ED-8F5C-31BE0255D80D}"/>
-              </a:ext>
-            </a:extLst>
-          </p:cNvPr>
-          <p:cNvSpPr/>
-          <p:nvPr/>
-        </p:nvSpPr>
-        <p:spPr>
-          <a:xfrm>
-            <a:off x="3772129" y="1565781"/>
-            <a:ext cx="1859651" cy="194383"/>
-          </a:xfrm>
-          <a:prstGeom prst="roundRect">
-            <a:avLst/>
-          </a:prstGeom>
-          <a:solidFill>
-            <a:schemeClr val="bg2"/>
-          </a:solidFill>
-          <a:ln>
-            <a:solidFill>
-              <a:schemeClr val="bg1"/>
-            </a:solidFill>
-          </a:ln>
-        </p:spPr>
-        <p:style>
-          <a:lnRef idx="2">
-            <a:schemeClr val="accent6"/>
-          </a:lnRef>
-          <a:fillRef idx="1">
-            <a:schemeClr val="lt1"/>
-          </a:fillRef>
-          <a:effectRef idx="0">
-            <a:schemeClr val="accent6"/>
-          </a:effectRef>
-          <a:fontRef idx="minor">
-            <a:schemeClr val="dk1"/>
-          </a:fontRef>
-        </p:style>
-        <p:txBody>
-          <a:bodyPr rtlCol="0" anchor="ctr"/>
-          <a:lstStyle/>
-          <a:p>
-            <a:pPr algn="ctr"/>
-            <a:r>
-              <a:rPr lang="fr-FR" sz="1200" dirty="0"/>
-              <a:t>Type 1</a:t>
-            </a:r>
-            <a:endParaRPr lang="fr-BE" sz="1200" dirty="0"/>
-          </a:p>
-        </p:txBody>
-      </p:sp>
-      <p:sp>
-        <p:nvSpPr>
-          <p:cNvPr id="9" name="Rectangle : coins arrondis 8">
-            <a:extLst>
-              <a:ext uri="{FF2B5EF4-FFF2-40B4-BE49-F238E27FC236}">
-                <a16:creationId xmlns:a16="http://schemas.microsoft.com/office/drawing/2014/main" id="{C3A94DB5-4C30-00F2-5412-446178F8CB5B}"/>
-              </a:ext>
-            </a:extLst>
-          </p:cNvPr>
-          <p:cNvSpPr/>
-          <p:nvPr/>
-        </p:nvSpPr>
-        <p:spPr>
-          <a:xfrm>
-            <a:off x="5826418" y="1569367"/>
-            <a:ext cx="1859651" cy="194383"/>
-          </a:xfrm>
-          <a:prstGeom prst="roundRect">
-            <a:avLst/>
-          </a:prstGeom>
-          <a:solidFill>
-            <a:schemeClr val="bg2"/>
-          </a:solidFill>
-          <a:ln>
-            <a:solidFill>
-              <a:schemeClr val="bg1"/>
-            </a:solidFill>
-          </a:ln>
-        </p:spPr>
-        <p:style>
-          <a:lnRef idx="2">
-            <a:schemeClr val="accent6"/>
-          </a:lnRef>
-          <a:fillRef idx="1">
-            <a:schemeClr val="lt1"/>
-          </a:fillRef>
-          <a:effectRef idx="0">
-            <a:schemeClr val="accent6"/>
-          </a:effectRef>
-          <a:fontRef idx="minor">
-            <a:schemeClr val="dk1"/>
-          </a:fontRef>
-        </p:style>
-        <p:txBody>
-          <a:bodyPr rtlCol="0" anchor="ctr"/>
-          <a:lstStyle/>
-          <a:p>
-            <a:pPr algn="ctr"/>
-            <a:r>
-              <a:rPr lang="fr-FR" sz="1200" dirty="0"/>
-              <a:t>Type 2</a:t>
-            </a:r>
-            <a:endParaRPr lang="fr-BE" sz="1200" dirty="0"/>
-          </a:p>
-        </p:txBody>
-      </p:sp>
-      <p:sp>
-        <p:nvSpPr>
-          <p:cNvPr id="11" name="Rectangle : coins arrondis 10">
-            <a:extLst>
-              <a:ext uri="{FF2B5EF4-FFF2-40B4-BE49-F238E27FC236}">
-                <a16:creationId xmlns:a16="http://schemas.microsoft.com/office/drawing/2014/main" id="{872445A9-5714-B8C2-6D5C-853B90C901BE}"/>
-              </a:ext>
-            </a:extLst>
-          </p:cNvPr>
-          <p:cNvSpPr/>
-          <p:nvPr/>
-        </p:nvSpPr>
-        <p:spPr>
-          <a:xfrm>
-            <a:off x="7982064" y="1568546"/>
-            <a:ext cx="1859651" cy="194383"/>
-          </a:xfrm>
-          <a:prstGeom prst="roundRect">
-            <a:avLst/>
-          </a:prstGeom>
-          <a:solidFill>
-            <a:schemeClr val="bg2"/>
-          </a:solidFill>
-          <a:ln>
-            <a:solidFill>
-              <a:schemeClr val="bg1"/>
-            </a:solidFill>
-          </a:ln>
-        </p:spPr>
-        <p:style>
-          <a:lnRef idx="2">
-            <a:schemeClr val="accent6"/>
-          </a:lnRef>
-          <a:fillRef idx="1">
-            <a:schemeClr val="lt1"/>
-          </a:fillRef>
-          <a:effectRef idx="0">
-            <a:schemeClr val="accent6"/>
-          </a:effectRef>
-          <a:fontRef idx="minor">
-            <a:schemeClr val="dk1"/>
-          </a:fontRef>
-        </p:style>
-        <p:txBody>
-          <a:bodyPr rtlCol="0" anchor="ctr"/>
-          <a:lstStyle/>
-          <a:p>
-            <a:pPr algn="ctr"/>
-            <a:r>
-              <a:rPr lang="fr-FR" sz="1200" dirty="0"/>
-              <a:t>Type 4</a:t>
-            </a:r>
-            <a:endParaRPr lang="fr-BE" sz="1200" dirty="0"/>
-          </a:p>
-        </p:txBody>
-      </p:sp>
-      <p:sp>
-        <p:nvSpPr>
-          <p:cNvPr id="12" name="Rectangle : coins arrondis 11">
-            <a:extLst>
-              <a:ext uri="{FF2B5EF4-FFF2-40B4-BE49-F238E27FC236}">
-                <a16:creationId xmlns:a16="http://schemas.microsoft.com/office/drawing/2014/main" id="{00C193E2-9EE2-5C76-154D-C114C5015C71}"/>
-              </a:ext>
-            </a:extLst>
-          </p:cNvPr>
-          <p:cNvSpPr/>
-          <p:nvPr/>
-        </p:nvSpPr>
-        <p:spPr>
-          <a:xfrm>
-            <a:off x="10137710" y="1567932"/>
-            <a:ext cx="1859651" cy="194383"/>
-          </a:xfrm>
-          <a:prstGeom prst="roundRect">
-            <a:avLst/>
-          </a:prstGeom>
-          <a:solidFill>
-            <a:schemeClr val="bg2"/>
-          </a:solidFill>
-          <a:ln>
-            <a:solidFill>
-              <a:schemeClr val="bg1"/>
-            </a:solidFill>
-          </a:ln>
-        </p:spPr>
-        <p:style>
-          <a:lnRef idx="2">
-            <a:schemeClr val="accent6"/>
-          </a:lnRef>
-          <a:fillRef idx="1">
-            <a:schemeClr val="lt1"/>
-          </a:fillRef>
-          <a:effectRef idx="0">
-            <a:schemeClr val="accent6"/>
-          </a:effectRef>
-          <a:fontRef idx="minor">
-            <a:schemeClr val="dk1"/>
-          </a:fontRef>
-        </p:style>
-        <p:txBody>
-          <a:bodyPr rtlCol="0" anchor="ctr"/>
-          <a:lstStyle/>
-          <a:p>
-            <a:pPr algn="ctr"/>
-            <a:r>
-              <a:rPr lang="fr-FR" sz="1200" dirty="0"/>
-              <a:t>Type 5</a:t>
-            </a:r>
-            <a:endParaRPr lang="fr-BE" sz="1200" dirty="0"/>
-          </a:p>
-        </p:txBody>
-      </p:sp>
     </p:spTree>
     <p:extLst>
       <p:ext uri="{BB962C8B-B14F-4D97-AF65-F5344CB8AC3E}">
@@ -5673,7 +5675,7 @@
         </p:nvSpPr>
         <p:spPr>
           <a:xfrm>
-            <a:off x="3483928" y="1319867"/>
+            <a:off x="3483928" y="1291874"/>
             <a:ext cx="8708072" cy="253916"/>
           </a:xfrm>
           <a:prstGeom prst="rect">
@@ -5694,7 +5696,7 @@
                   <a:srgbClr val="0070C0"/>
                 </a:solidFill>
               </a:rPr>
-              <a:t>Revenue </a:t>
+              <a:t>Budget </a:t>
             </a:r>
             <a:r>
               <a:rPr lang="fr-FR" sz="1050" b="1" i="1" dirty="0" err="1">

</xml_diff>

<commit_message>
trade exposure figure in coeff
</commit_message>
<xml_diff>
--- a/embedded_COEFFS_substitutability_maize_quadrant_full_5.0.pptx
+++ b/embedded_COEFFS_substitutability_maize_quadrant_full_5.0.pptx
@@ -242,7 +242,7 @@
           <a:p>
             <a:fld id="{B4F1BE71-D697-4FA9-9464-5030FED053B9}" type="datetimeFigureOut">
               <a:rPr lang="fr-FR" smtClean="0"/>
-              <a:t>23/10/2024</a:t>
+              <a:t>17/02/2025</a:t>
             </a:fld>
             <a:endParaRPr lang="fr-FR"/>
           </a:p>
@@ -410,7 +410,7 @@
           <a:p>
             <a:fld id="{B4F1BE71-D697-4FA9-9464-5030FED053B9}" type="datetimeFigureOut">
               <a:rPr lang="fr-FR" smtClean="0"/>
-              <a:t>23/10/2024</a:t>
+              <a:t>17/02/2025</a:t>
             </a:fld>
             <a:endParaRPr lang="fr-FR"/>
           </a:p>
@@ -588,7 +588,7 @@
           <a:p>
             <a:fld id="{B4F1BE71-D697-4FA9-9464-5030FED053B9}" type="datetimeFigureOut">
               <a:rPr lang="fr-FR" smtClean="0"/>
-              <a:t>23/10/2024</a:t>
+              <a:t>17/02/2025</a:t>
             </a:fld>
             <a:endParaRPr lang="fr-FR"/>
           </a:p>
@@ -756,7 +756,7 @@
           <a:p>
             <a:fld id="{B4F1BE71-D697-4FA9-9464-5030FED053B9}" type="datetimeFigureOut">
               <a:rPr lang="fr-FR" smtClean="0"/>
-              <a:t>23/10/2024</a:t>
+              <a:t>17/02/2025</a:t>
             </a:fld>
             <a:endParaRPr lang="fr-FR"/>
           </a:p>
@@ -1001,7 +1001,7 @@
           <a:p>
             <a:fld id="{B4F1BE71-D697-4FA9-9464-5030FED053B9}" type="datetimeFigureOut">
               <a:rPr lang="fr-FR" smtClean="0"/>
-              <a:t>23/10/2024</a:t>
+              <a:t>17/02/2025</a:t>
             </a:fld>
             <a:endParaRPr lang="fr-FR"/>
           </a:p>
@@ -1230,7 +1230,7 @@
           <a:p>
             <a:fld id="{B4F1BE71-D697-4FA9-9464-5030FED053B9}" type="datetimeFigureOut">
               <a:rPr lang="fr-FR" smtClean="0"/>
-              <a:t>23/10/2024</a:t>
+              <a:t>17/02/2025</a:t>
             </a:fld>
             <a:endParaRPr lang="fr-FR"/>
           </a:p>
@@ -1594,7 +1594,7 @@
           <a:p>
             <a:fld id="{B4F1BE71-D697-4FA9-9464-5030FED053B9}" type="datetimeFigureOut">
               <a:rPr lang="fr-FR" smtClean="0"/>
-              <a:t>23/10/2024</a:t>
+              <a:t>17/02/2025</a:t>
             </a:fld>
             <a:endParaRPr lang="fr-FR"/>
           </a:p>
@@ -1711,7 +1711,7 @@
           <a:p>
             <a:fld id="{B4F1BE71-D697-4FA9-9464-5030FED053B9}" type="datetimeFigureOut">
               <a:rPr lang="fr-FR" smtClean="0"/>
-              <a:t>23/10/2024</a:t>
+              <a:t>17/02/2025</a:t>
             </a:fld>
             <a:endParaRPr lang="fr-FR"/>
           </a:p>
@@ -1806,7 +1806,7 @@
           <a:p>
             <a:fld id="{B4F1BE71-D697-4FA9-9464-5030FED053B9}" type="datetimeFigureOut">
               <a:rPr lang="fr-FR" smtClean="0"/>
-              <a:t>23/10/2024</a:t>
+              <a:t>17/02/2025</a:t>
             </a:fld>
             <a:endParaRPr lang="fr-FR"/>
           </a:p>
@@ -2081,7 +2081,7 @@
           <a:p>
             <a:fld id="{B4F1BE71-D697-4FA9-9464-5030FED053B9}" type="datetimeFigureOut">
               <a:rPr lang="fr-FR" smtClean="0"/>
-              <a:t>23/10/2024</a:t>
+              <a:t>17/02/2025</a:t>
             </a:fld>
             <a:endParaRPr lang="fr-FR"/>
           </a:p>
@@ -2333,7 +2333,7 @@
           <a:p>
             <a:fld id="{B4F1BE71-D697-4FA9-9464-5030FED053B9}" type="datetimeFigureOut">
               <a:rPr lang="fr-FR" smtClean="0"/>
-              <a:t>23/10/2024</a:t>
+              <a:t>17/02/2025</a:t>
             </a:fld>
             <a:endParaRPr lang="fr-FR"/>
           </a:p>
@@ -2544,7 +2544,7 @@
           <a:p>
             <a:fld id="{B4F1BE71-D697-4FA9-9464-5030FED053B9}" type="datetimeFigureOut">
               <a:rPr lang="fr-FR" smtClean="0"/>
-              <a:t>23/10/2024</a:t>
+              <a:t>17/02/2025</a:t>
             </a:fld>
             <a:endParaRPr lang="fr-FR"/>
           </a:p>
@@ -3155,8 +3155,12 @@
           <a:p>
             <a:pPr algn="ctr"/>
             <a:r>
+              <a:rPr lang="fr-FR" sz="1200" b="1"/>
+              <a:t>RFS2 </a:t>
+            </a:r>
+            <a:r>
               <a:rPr lang="fr-FR" sz="1200" b="1" dirty="0"/>
-              <a:t>RFS mandates</a:t>
+              <a:t>mandates</a:t>
             </a:r>
             <a:endParaRPr lang="fr-FR" sz="1200" dirty="0"/>
           </a:p>

</xml_diff>